<commit_message>
update to Version 0.04
</commit_message>
<xml_diff>
--- a/KK4D使用方法.pptx
+++ b/KK4D使用方法.pptx
@@ -927,7 +927,10 @@
             <a:rPr lang="en-US" dirty="0" err="1"/>
             <a:t>coline</a:t>
           </a:r>
-          <a:endParaRPr lang="en-US" dirty="0"/>
+          <a:r>
+            <a:rPr lang="en-US" dirty="0"/>
+            <a:t> –c config.ini</a:t>
+          </a:r>
         </a:p>
       </dgm:t>
     </dgm:pt>
@@ -997,8 +1000,16 @@
         <a:lstStyle/>
         <a:p>
           <a:r>
-            <a:rPr lang="en-US"/>
-            <a:t>KK4D.sh kaks</a:t>
+            <a:rPr lang="en-US" dirty="0"/>
+            <a:t>KK4D.sh </a:t>
+          </a:r>
+          <a:r>
+            <a:rPr lang="en-US" dirty="0" err="1"/>
+            <a:t>kaks</a:t>
+          </a:r>
+          <a:r>
+            <a:rPr lang="en-US" dirty="0"/>
+            <a:t> –c config.ini</a:t>
           </a:r>
         </a:p>
       </dgm:t>
@@ -1069,9 +1080,14 @@
         <a:lstStyle/>
         <a:p>
           <a:r>
-            <a:rPr lang="en-US"/>
-            <a:t>KK4D.sh 4DTV</a:t>
+            <a:rPr lang="en-US" dirty="0"/>
+            <a:t>KK4D.sh 4DTV </a:t>
           </a:r>
+          <a:r>
+            <a:rPr lang="en-US" altLang="zh-CN" dirty="0"/>
+            <a:t>–c config.ini</a:t>
+          </a:r>
+          <a:endParaRPr lang="en-US" dirty="0"/>
         </a:p>
       </dgm:t>
     </dgm:pt>
@@ -1141,8 +1157,8 @@
         <a:lstStyle/>
         <a:p>
           <a:r>
-            <a:rPr lang="en-US"/>
-            <a:t>KK4D.sh bed</a:t>
+            <a:rPr lang="en-US" dirty="0"/>
+            <a:t>KK4D.sh bed –c config.ini</a:t>
           </a:r>
         </a:p>
       </dgm:t>
@@ -1213,8 +1229,8 @@
         <a:lstStyle/>
         <a:p>
           <a:r>
-            <a:rPr lang="en-US"/>
-            <a:t>KK4D.sh pep</a:t>
+            <a:rPr lang="en-US" dirty="0"/>
+            <a:t>KK4D.sh pep –c config.ini</a:t>
           </a:r>
         </a:p>
       </dgm:t>
@@ -1285,8 +1301,16 @@
         <a:lstStyle/>
         <a:p>
           <a:r>
-            <a:rPr lang="en-US"/>
-            <a:t>KK4D.sh cds</a:t>
+            <a:rPr lang="en-US" dirty="0"/>
+            <a:t>KK4D.sh </a:t>
+          </a:r>
+          <a:r>
+            <a:rPr lang="en-US" dirty="0" err="1"/>
+            <a:t>cds</a:t>
+          </a:r>
+          <a:r>
+            <a:rPr lang="en-US" dirty="0"/>
+            <a:t> –c config.ini</a:t>
           </a:r>
         </a:p>
       </dgm:t>
@@ -1357,8 +1381,8 @@
         <a:lstStyle/>
         <a:p>
           <a:r>
-            <a:rPr lang="en-US"/>
-            <a:t>KK4D.sh all</a:t>
+            <a:rPr lang="en-US" dirty="0"/>
+            <a:t>KK4D.sh all –c config.ini</a:t>
           </a:r>
         </a:p>
       </dgm:t>
@@ -1711,7 +1735,10 @@
             <a:rPr lang="en-US" sz="1200" kern="1200" dirty="0" err="1"/>
             <a:t>coline</a:t>
           </a:r>
-          <a:endParaRPr lang="en-US" sz="1200" kern="1200" dirty="0"/>
+          <a:r>
+            <a:rPr lang="en-US" sz="1200" kern="1200" dirty="0"/>
+            <a:t> –c config.ini</a:t>
+          </a:r>
         </a:p>
       </dsp:txBody>
       <dsp:txXfrm>
@@ -1846,8 +1873,16 @@
             <a:buChar char="•"/>
           </a:pPr>
           <a:r>
-            <a:rPr lang="en-US" sz="1200" kern="1200"/>
-            <a:t>KK4D.sh kaks</a:t>
+            <a:rPr lang="en-US" sz="1200" kern="1200" dirty="0"/>
+            <a:t>KK4D.sh </a:t>
+          </a:r>
+          <a:r>
+            <a:rPr lang="en-US" sz="1200" kern="1200" dirty="0" err="1"/>
+            <a:t>kaks</a:t>
+          </a:r>
+          <a:r>
+            <a:rPr lang="en-US" sz="1200" kern="1200" dirty="0"/>
+            <a:t> –c config.ini</a:t>
           </a:r>
         </a:p>
       </dsp:txBody>
@@ -1983,9 +2018,14 @@
             <a:buChar char="•"/>
           </a:pPr>
           <a:r>
-            <a:rPr lang="en-US" sz="1200" kern="1200"/>
-            <a:t>KK4D.sh 4DTV</a:t>
+            <a:rPr lang="en-US" sz="1200" kern="1200" dirty="0"/>
+            <a:t>KK4D.sh 4DTV </a:t>
           </a:r>
+          <a:r>
+            <a:rPr lang="en-US" altLang="zh-CN" sz="1200" kern="1200" dirty="0"/>
+            <a:t>–c config.ini</a:t>
+          </a:r>
+          <a:endParaRPr lang="en-US" sz="1200" kern="1200" dirty="0"/>
         </a:p>
       </dsp:txBody>
       <dsp:txXfrm>
@@ -2120,8 +2160,8 @@
             <a:buChar char="•"/>
           </a:pPr>
           <a:r>
-            <a:rPr lang="en-US" sz="1200" kern="1200"/>
-            <a:t>KK4D.sh bed</a:t>
+            <a:rPr lang="en-US" sz="1200" kern="1200" dirty="0"/>
+            <a:t>KK4D.sh bed –c config.ini</a:t>
           </a:r>
         </a:p>
       </dsp:txBody>
@@ -2257,8 +2297,8 @@
             <a:buChar char="•"/>
           </a:pPr>
           <a:r>
-            <a:rPr lang="en-US" sz="1200" kern="1200"/>
-            <a:t>KK4D.sh pep</a:t>
+            <a:rPr lang="en-US" sz="1200" kern="1200" dirty="0"/>
+            <a:t>KK4D.sh pep –c config.ini</a:t>
           </a:r>
         </a:p>
       </dsp:txBody>
@@ -2394,8 +2434,16 @@
             <a:buChar char="•"/>
           </a:pPr>
           <a:r>
-            <a:rPr lang="en-US" sz="1200" kern="1200"/>
-            <a:t>KK4D.sh cds</a:t>
+            <a:rPr lang="en-US" sz="1200" kern="1200" dirty="0"/>
+            <a:t>KK4D.sh </a:t>
+          </a:r>
+          <a:r>
+            <a:rPr lang="en-US" sz="1200" kern="1200" dirty="0" err="1"/>
+            <a:t>cds</a:t>
+          </a:r>
+          <a:r>
+            <a:rPr lang="en-US" sz="1200" kern="1200" dirty="0"/>
+            <a:t> –c config.ini</a:t>
           </a:r>
         </a:p>
       </dsp:txBody>
@@ -2531,8 +2579,8 @@
             <a:buChar char="•"/>
           </a:pPr>
           <a:r>
-            <a:rPr lang="en-US" sz="1200" kern="1200"/>
-            <a:t>KK4D.sh all</a:t>
+            <a:rPr lang="en-US" sz="1200" kern="1200" dirty="0"/>
+            <a:t>KK4D.sh all –c config.ini</a:t>
           </a:r>
         </a:p>
       </dsp:txBody>
@@ -3972,7 +4020,7 @@
           <a:p>
             <a:fld id="{8DEA2CF1-0EB2-4673-802D-3371233E4A77}" type="datetime2">
               <a:rPr lang="en-US" smtClean="0"/>
-              <a:t>Friday, June 18, 2021</a:t>
+              <a:t>Friday, April 22, 2022</a:t>
             </a:fld>
             <a:endParaRPr lang="en-US" dirty="0"/>
           </a:p>
@@ -4187,7 +4235,7 @@
           <a:p>
             <a:fld id="{8DEA2CF1-0EB2-4673-802D-3371233E4A77}" type="datetime2">
               <a:rPr lang="en-US" smtClean="0"/>
-              <a:t>Friday, June 18, 2021</a:t>
+              <a:t>Friday, April 22, 2022</a:t>
             </a:fld>
             <a:endParaRPr lang="en-US" dirty="0"/>
           </a:p>
@@ -4450,7 +4498,7 @@
           <a:p>
             <a:fld id="{8DEA2CF1-0EB2-4673-802D-3371233E4A77}" type="datetime2">
               <a:rPr lang="en-US" smtClean="0"/>
-              <a:t>Friday, June 18, 2021</a:t>
+              <a:t>Friday, April 22, 2022</a:t>
             </a:fld>
             <a:endParaRPr lang="en-US" dirty="0"/>
           </a:p>
@@ -4631,7 +4679,7 @@
           <a:p>
             <a:fld id="{8DEA2CF1-0EB2-4673-802D-3371233E4A77}" type="datetime2">
               <a:rPr lang="en-US" smtClean="0"/>
-              <a:t>Friday, June 18, 2021</a:t>
+              <a:t>Friday, April 22, 2022</a:t>
             </a:fld>
             <a:endParaRPr lang="en-US" dirty="0"/>
           </a:p>
@@ -4981,7 +5029,7 @@
           <a:p>
             <a:fld id="{8DEA2CF1-0EB2-4673-802D-3371233E4A77}" type="datetime2">
               <a:rPr lang="en-US" smtClean="0"/>
-              <a:t>Friday, June 18, 2021</a:t>
+              <a:t>Friday, April 22, 2022</a:t>
             </a:fld>
             <a:endParaRPr lang="en-US" dirty="0"/>
           </a:p>
@@ -5263,7 +5311,7 @@
           <a:p>
             <a:fld id="{8DEA2CF1-0EB2-4673-802D-3371233E4A77}" type="datetime2">
               <a:rPr lang="en-US" smtClean="0"/>
-              <a:t>Friday, June 18, 2021</a:t>
+              <a:t>Friday, April 22, 2022</a:t>
             </a:fld>
             <a:endParaRPr lang="en-US" dirty="0"/>
           </a:p>
@@ -5649,7 +5697,7 @@
           <a:p>
             <a:fld id="{8DEA2CF1-0EB2-4673-802D-3371233E4A77}" type="datetime2">
               <a:rPr lang="en-US" smtClean="0"/>
-              <a:t>Friday, June 18, 2021</a:t>
+              <a:t>Friday, April 22, 2022</a:t>
             </a:fld>
             <a:endParaRPr lang="en-US" dirty="0"/>
           </a:p>
@@ -5774,7 +5822,7 @@
           <a:p>
             <a:fld id="{8DEA2CF1-0EB2-4673-802D-3371233E4A77}" type="datetime2">
               <a:rPr lang="en-US" smtClean="0"/>
-              <a:t>Friday, June 18, 2021</a:t>
+              <a:t>Friday, April 22, 2022</a:t>
             </a:fld>
             <a:endParaRPr lang="en-US" dirty="0"/>
           </a:p>
@@ -5952,7 +6000,7 @@
           <a:p>
             <a:fld id="{8DEA2CF1-0EB2-4673-802D-3371233E4A77}" type="datetime2">
               <a:rPr lang="en-US" smtClean="0"/>
-              <a:t>Friday, June 18, 2021</a:t>
+              <a:t>Friday, April 22, 2022</a:t>
             </a:fld>
             <a:endParaRPr lang="en-US" dirty="0"/>
           </a:p>
@@ -6313,7 +6361,7 @@
           <a:p>
             <a:fld id="{8DEA2CF1-0EB2-4673-802D-3371233E4A77}" type="datetime2">
               <a:rPr lang="en-US" smtClean="0"/>
-              <a:t>Friday, June 18, 2021</a:t>
+              <a:t>Friday, April 22, 2022</a:t>
             </a:fld>
             <a:endParaRPr lang="en-US" dirty="0"/>
           </a:p>
@@ -6702,7 +6750,7 @@
           <a:p>
             <a:fld id="{8DEA2CF1-0EB2-4673-802D-3371233E4A77}" type="datetime2">
               <a:rPr lang="en-US" smtClean="0"/>
-              <a:t>Friday, June 18, 2021</a:t>
+              <a:t>Friday, April 22, 2022</a:t>
             </a:fld>
             <a:endParaRPr lang="en-US" dirty="0"/>
           </a:p>
@@ -6996,7 +7044,7 @@
           <a:p>
             <a:fld id="{8DEA2CF1-0EB2-4673-802D-3371233E4A77}" type="datetime2">
               <a:rPr lang="en-US" smtClean="0"/>
-              <a:t>Friday, June 18, 2021</a:t>
+              <a:t>Friday, April 22, 2022</a:t>
             </a:fld>
             <a:endParaRPr lang="en-US" dirty="0"/>
           </a:p>
@@ -7717,8 +7765,8 @@
         </p:nvSpPr>
         <p:spPr>
           <a:xfrm>
-            <a:off x="971606" y="2115506"/>
-            <a:ext cx="3162186" cy="2384302"/>
+            <a:off x="708902" y="1517352"/>
+            <a:ext cx="2874715" cy="2384302"/>
           </a:xfrm>
         </p:spPr>
         <p:txBody>
@@ -8239,8 +8287,8 @@
         </p:nvSpPr>
         <p:spPr>
           <a:xfrm>
-            <a:off x="4974770" y="4513579"/>
-            <a:ext cx="4773966" cy="1171603"/>
+            <a:off x="631595" y="4045411"/>
+            <a:ext cx="9411078" cy="2319609"/>
           </a:xfrm>
           <a:prstGeom prst="rect">
             <a:avLst/>
@@ -8272,7 +8320,7 @@
               <a:defRPr/>
             </a:pPr>
             <a:r>
-              <a:rPr lang="zh-CN" altLang="en-US" sz="1600" b="1" dirty="0">
+              <a:rPr lang="zh-CN" altLang="en-US" sz="1200" b="1" dirty="0">
                 <a:solidFill>
                   <a:srgbClr val="000000">
                     <a:lumMod val="75000"/>
@@ -8284,7 +8332,7 @@
               </a:rPr>
               <a:t>使用方法</a:t>
             </a:r>
-            <a:endParaRPr lang="en-US" altLang="zh-CN" sz="1600" b="1" dirty="0">
+            <a:endParaRPr lang="en-US" altLang="zh-CN" sz="1200" b="1" dirty="0">
               <a:solidFill>
                 <a:srgbClr val="000000">
                   <a:lumMod val="75000"/>
@@ -8315,28 +8363,42 @@
               <a:defRPr/>
             </a:pPr>
             <a:r>
-              <a:rPr lang="en-US" altLang="zh-CN" dirty="0"/>
+              <a:rPr lang="en-US" altLang="zh-CN" sz="1200" dirty="0"/>
               <a:t>1.</a:t>
             </a:r>
             <a:r>
-              <a:rPr lang="zh-CN" altLang="en-US" dirty="0"/>
+              <a:rPr lang="zh-CN" altLang="en-US" sz="1200" dirty="0"/>
               <a:t>修改</a:t>
             </a:r>
             <a:r>
-              <a:rPr lang="en-US" altLang="zh-CN" b="0" i="0" dirty="0">
+              <a:rPr lang="en-US" altLang="zh-CN" sz="1200" b="0" i="0" dirty="0">
                 <a:effectLst/>
                 <a:latin typeface="Roboto Mono"/>
               </a:rPr>
               <a:t>config.ini</a:t>
             </a:r>
             <a:r>
-              <a:rPr lang="zh-CN" altLang="en-US" b="0" i="0" dirty="0">
+              <a:rPr lang="zh-CN" altLang="en-US" sz="1200" b="0" i="0" dirty="0">
                 <a:effectLst/>
                 <a:latin typeface="Roboto Mono"/>
               </a:rPr>
               <a:t>里面的参数值</a:t>
             </a:r>
-            <a:endParaRPr lang="en-US" altLang="zh-CN" b="0" i="0" dirty="0">
+            <a:r>
+              <a:rPr lang="en-US" altLang="zh-CN" sz="1200" b="0" i="0" dirty="0">
+                <a:effectLst/>
+                <a:latin typeface="Roboto Mono"/>
+              </a:rPr>
+              <a:t>,</a:t>
+            </a:r>
+            <a:r>
+              <a:rPr lang="zh-CN" altLang="en-US" sz="1200" b="0" i="0" dirty="0">
+                <a:effectLst/>
+                <a:latin typeface="Roboto Mono"/>
+              </a:rPr>
+              <a:t>复制到工作目录</a:t>
+            </a:r>
+            <a:endParaRPr lang="en-US" altLang="zh-CN" sz="1200" b="0" i="0" dirty="0">
               <a:effectLst/>
               <a:latin typeface="Roboto Mono"/>
             </a:endParaRPr>
@@ -8361,18 +8423,250 @@
               <a:defRPr/>
             </a:pPr>
             <a:r>
-              <a:rPr lang="en-US" altLang="zh-CN" dirty="0"/>
+              <a:rPr lang="en-US" altLang="zh-CN" sz="1200" dirty="0"/>
               <a:t>2.</a:t>
             </a:r>
             <a:r>
-              <a:rPr lang="zh-CN" altLang="en-US" dirty="0"/>
+              <a:rPr lang="zh-CN" altLang="en-US" sz="1200" dirty="0"/>
               <a:t>运行</a:t>
             </a:r>
             <a:r>
-              <a:rPr lang="en-US" altLang="zh-CN" dirty="0"/>
-              <a:t>KK4D.sh all</a:t>
-            </a:r>
-            <a:endParaRPr lang="zh-CN" altLang="en-US" dirty="0"/>
+              <a:rPr lang="en-US" altLang="zh-CN" sz="1200" dirty="0"/>
+              <a:t>KK4D.sh all –c path/config.ini </a:t>
+            </a:r>
+          </a:p>
+          <a:p>
+            <a:pPr marL="91440" indent="-91440" defTabSz="914400">
+              <a:lnSpc>
+                <a:spcPct val="90000"/>
+              </a:lnSpc>
+              <a:spcBef>
+                <a:spcPts val="1200"/>
+              </a:spcBef>
+              <a:spcAft>
+                <a:spcPts val="200"/>
+              </a:spcAft>
+              <a:buClr>
+                <a:srgbClr val="E48312"/>
+              </a:buClr>
+              <a:buSzPct val="100000"/>
+              <a:buFont typeface="Calibri" panose="020F0502020204030204" pitchFamily="34" charset="0"/>
+              <a:buChar char=" "/>
+              <a:defRPr/>
+            </a:pPr>
+            <a:r>
+              <a:rPr lang="zh-CN" altLang="en-US" sz="1200" dirty="0"/>
+              <a:t>现在也可以在命令行里指定具体参数来运行</a:t>
+            </a:r>
+            <a:endParaRPr lang="en-US" altLang="zh-CN" sz="1200" dirty="0"/>
+          </a:p>
+          <a:p>
+            <a:pPr marL="91440" indent="-91440" defTabSz="914400">
+              <a:lnSpc>
+                <a:spcPct val="90000"/>
+              </a:lnSpc>
+              <a:spcBef>
+                <a:spcPts val="1200"/>
+              </a:spcBef>
+              <a:spcAft>
+                <a:spcPts val="200"/>
+              </a:spcAft>
+              <a:buClr>
+                <a:srgbClr val="E48312"/>
+              </a:buClr>
+              <a:buSzPct val="100000"/>
+              <a:buFont typeface="Calibri" panose="020F0502020204030204" pitchFamily="34" charset="0"/>
+              <a:buChar char=" "/>
+              <a:defRPr/>
+            </a:pPr>
+            <a:r>
+              <a:rPr lang="en-US" altLang="zh-CN" sz="1200" dirty="0"/>
+              <a:t>KK4D.sh all -group 1 -</a:t>
+            </a:r>
+            <a:r>
+              <a:rPr lang="en-US" altLang="zh-CN" sz="1200" dirty="0" err="1"/>
+              <a:t>cpu</a:t>
+            </a:r>
+            <a:r>
+              <a:rPr lang="en-US" altLang="zh-CN" sz="1200" dirty="0"/>
+              <a:t> 24 -key ID -type mRNA -sample </a:t>
+            </a:r>
+            <a:r>
+              <a:rPr lang="en-US" altLang="zh-CN" sz="1200" dirty="0" err="1"/>
+              <a:t>M.domestica</a:t>
+            </a:r>
+            <a:r>
+              <a:rPr lang="en-US" altLang="zh-CN" sz="1200" dirty="0"/>
+              <a:t> -</a:t>
+            </a:r>
+            <a:r>
+              <a:rPr lang="en-US" altLang="zh-CN" sz="1200" dirty="0" err="1"/>
+              <a:t>abbr</a:t>
+            </a:r>
+            <a:r>
+              <a:rPr lang="en-US" altLang="zh-CN" sz="1200" dirty="0"/>
+              <a:t> </a:t>
+            </a:r>
+            <a:r>
+              <a:rPr lang="en-US" altLang="zh-CN" sz="1200" dirty="0" err="1"/>
+              <a:t>Mdo</a:t>
+            </a:r>
+            <a:r>
+              <a:rPr lang="en-US" altLang="zh-CN" sz="1200" dirty="0"/>
+              <a:t> -gff3 gene_models_20170612.gff3.gz -protein /share/home/</a:t>
+            </a:r>
+            <a:r>
+              <a:rPr lang="en-US" altLang="zh-CN" sz="1200" dirty="0" err="1"/>
+              <a:t>Mdo.pep.fa</a:t>
+            </a:r>
+            <a:r>
+              <a:rPr lang="en-US" altLang="zh-CN" sz="1200" dirty="0"/>
+              <a:t> -</a:t>
+            </a:r>
+            <a:r>
+              <a:rPr lang="en-US" altLang="zh-CN" sz="1200" dirty="0" err="1"/>
+              <a:t>cds</a:t>
+            </a:r>
+            <a:r>
+              <a:rPr lang="en-US" altLang="zh-CN" sz="1200" dirty="0"/>
+              <a:t> /share/home/</a:t>
+            </a:r>
+            <a:r>
+              <a:rPr lang="en-US" altLang="zh-CN" sz="1200" dirty="0" err="1"/>
+              <a:t>Mdo.cds.fa</a:t>
+            </a:r>
+            <a:r>
+              <a:rPr lang="en-US" altLang="zh-CN" sz="1200" dirty="0"/>
+              <a:t> -</a:t>
+            </a:r>
+            <a:r>
+              <a:rPr lang="en-US" altLang="zh-CN" sz="1200" dirty="0" err="1"/>
+              <a:t>chrnum</a:t>
+            </a:r>
+            <a:r>
+              <a:rPr lang="en-US" altLang="zh-CN" sz="1200" dirty="0"/>
+              <a:t> 17 </a:t>
+            </a:r>
+          </a:p>
+          <a:p>
+            <a:pPr marL="91440" indent="-91440" defTabSz="914400">
+              <a:lnSpc>
+                <a:spcPct val="90000"/>
+              </a:lnSpc>
+              <a:spcBef>
+                <a:spcPts val="1200"/>
+              </a:spcBef>
+              <a:spcAft>
+                <a:spcPts val="200"/>
+              </a:spcAft>
+              <a:buClr>
+                <a:srgbClr val="E48312"/>
+              </a:buClr>
+              <a:buSzPct val="100000"/>
+              <a:buFont typeface="Calibri" panose="020F0502020204030204" pitchFamily="34" charset="0"/>
+              <a:buChar char=" "/>
+              <a:defRPr/>
+            </a:pPr>
+            <a:r>
+              <a:rPr lang="en-US" altLang="zh-CN" sz="1200" dirty="0"/>
+              <a:t>KK4D.sh all -group 2 -</a:t>
+            </a:r>
+            <a:r>
+              <a:rPr lang="en-US" altLang="zh-CN" sz="1200" dirty="0" err="1"/>
+              <a:t>cpu</a:t>
+            </a:r>
+            <a:r>
+              <a:rPr lang="en-US" altLang="zh-CN" sz="1200" dirty="0"/>
+              <a:t> 32 -key ID </a:t>
+            </a:r>
+            <a:r>
+              <a:rPr lang="en-US" altLang="zh-CN" sz="1200" dirty="0" err="1"/>
+              <a:t>ID</a:t>
+            </a:r>
+            <a:r>
+              <a:rPr lang="en-US" altLang="zh-CN" sz="1200" dirty="0"/>
+              <a:t> -type mRNA </a:t>
+            </a:r>
+            <a:r>
+              <a:rPr lang="en-US" altLang="zh-CN" sz="1200" dirty="0" err="1"/>
+              <a:t>mRNA</a:t>
+            </a:r>
+            <a:r>
+              <a:rPr lang="en-US" altLang="zh-CN" sz="1200" dirty="0"/>
+              <a:t> -sample </a:t>
+            </a:r>
+            <a:r>
+              <a:rPr lang="en-US" altLang="zh-CN" sz="1200" dirty="0" err="1"/>
+              <a:t>A.trichopoda</a:t>
+            </a:r>
+            <a:r>
+              <a:rPr lang="en-US" altLang="zh-CN" sz="1200" dirty="0"/>
+              <a:t> </a:t>
+            </a:r>
+            <a:r>
+              <a:rPr lang="en-US" altLang="zh-CN" sz="1200" dirty="0" err="1"/>
+              <a:t>M.domestica</a:t>
+            </a:r>
+            <a:r>
+              <a:rPr lang="en-US" altLang="zh-CN" sz="1200" dirty="0"/>
+              <a:t> -</a:t>
+            </a:r>
+            <a:r>
+              <a:rPr lang="en-US" altLang="zh-CN" sz="1200" dirty="0" err="1"/>
+              <a:t>abbr</a:t>
+            </a:r>
+            <a:r>
+              <a:rPr lang="en-US" altLang="zh-CN" sz="1200" dirty="0"/>
+              <a:t> </a:t>
+            </a:r>
+            <a:r>
+              <a:rPr lang="en-US" altLang="zh-CN" sz="1200" dirty="0" err="1"/>
+              <a:t>Ath</a:t>
+            </a:r>
+            <a:r>
+              <a:rPr lang="en-US" altLang="zh-CN" sz="1200" dirty="0"/>
+              <a:t> </a:t>
+            </a:r>
+            <a:r>
+              <a:rPr lang="en-US" altLang="zh-CN" sz="1200" dirty="0" err="1"/>
+              <a:t>Mdo</a:t>
+            </a:r>
+            <a:r>
+              <a:rPr lang="en-US" altLang="zh-CN" sz="1200" dirty="0"/>
+              <a:t> -gff3 Ath.chr1.gff3 Mdo.chr1.gff3 -protein Ath.pep.fa.gz </a:t>
+            </a:r>
+            <a:r>
+              <a:rPr lang="en-US" altLang="zh-CN" sz="1200" dirty="0" err="1"/>
+              <a:t>Mdo.genome.protein.fa</a:t>
+            </a:r>
+            <a:r>
+              <a:rPr lang="en-US" altLang="zh-CN" sz="1200" dirty="0"/>
+              <a:t> -</a:t>
+            </a:r>
+            <a:r>
+              <a:rPr lang="en-US" altLang="zh-CN" sz="1200" dirty="0" err="1"/>
+              <a:t>cds</a:t>
+            </a:r>
+            <a:r>
+              <a:rPr lang="en-US" altLang="zh-CN" sz="1200" dirty="0"/>
+              <a:t> Ath.cds.fa.gz </a:t>
+            </a:r>
+            <a:r>
+              <a:rPr lang="en-US" altLang="zh-CN" sz="1200" dirty="0" err="1"/>
+              <a:t>Mdo.cds.fa</a:t>
+            </a:r>
+            <a:r>
+              <a:rPr lang="en-US" altLang="zh-CN" sz="1200" dirty="0"/>
+              <a:t> -</a:t>
+            </a:r>
+            <a:r>
+              <a:rPr lang="en-US" altLang="zh-CN" sz="1200" dirty="0" err="1"/>
+              <a:t>chrnum</a:t>
+            </a:r>
+            <a:r>
+              <a:rPr lang="en-US" altLang="zh-CN" sz="1200" dirty="0"/>
+              <a:t> 1 1</a:t>
+            </a:r>
           </a:p>
         </p:txBody>
       </p:sp>
@@ -8644,7 +8938,7 @@
             <p:ph idx="1"/>
             <p:extLst>
               <p:ext uri="{D42A27DB-BD31-4B8C-83A1-F6EECF244321}">
-                <p14:modId xmlns:p14="http://schemas.microsoft.com/office/powerpoint/2010/main" val="2463853100"/>
+                <p14:modId xmlns:p14="http://schemas.microsoft.com/office/powerpoint/2010/main" val="3657598297"/>
               </p:ext>
             </p:extLst>
           </p:nvPr>
@@ -9053,7 +9347,7 @@
                   </a:schemeClr>
                 </a:solidFill>
               </a:rPr>
-              <a:t>="/share/home/chaimao1/database/test" </a:t>
+              <a:t>="/share/home/database/test" </a:t>
             </a:r>
           </a:p>
           <a:p>

</xml_diff>

<commit_message>
release the version 1.0
</commit_message>
<xml_diff>
--- a/KK4D使用方法.pptx
+++ b/KK4D使用方法.pptx
@@ -7,8 +7,9 @@
   <p:sldIdLst>
     <p:sldId id="265" r:id="rId2"/>
     <p:sldId id="266" r:id="rId3"/>
-    <p:sldId id="267" r:id="rId4"/>
-    <p:sldId id="268" r:id="rId5"/>
+    <p:sldId id="269" r:id="rId4"/>
+    <p:sldId id="267" r:id="rId5"/>
+    <p:sldId id="268" r:id="rId6"/>
   </p:sldIdLst>
   <p:sldSz cx="12192000" cy="6858000"/>
   <p:notesSz cx="6858000" cy="9144000"/>
@@ -862,7 +863,1174 @@
 </dgm:colorsDef>
 </file>
 
+<file path=ppt/diagrams/colors2.xml><?xml version="1.0" encoding="utf-8"?>
+<dgm:colorsDef xmlns:dgm="http://schemas.openxmlformats.org/drawingml/2006/diagram" xmlns:a="http://schemas.openxmlformats.org/drawingml/2006/main" uniqueId="urn:microsoft.com/office/officeart/2005/8/colors/accent1_2">
+  <dgm:title val=""/>
+  <dgm:desc val=""/>
+  <dgm:catLst>
+    <dgm:cat type="accent1" pri="11200"/>
+  </dgm:catLst>
+  <dgm:styleLbl name="node0">
+    <dgm:fillClrLst meth="repeat">
+      <a:schemeClr val="accent1"/>
+    </dgm:fillClrLst>
+    <dgm:linClrLst meth="repeat">
+      <a:schemeClr val="lt1"/>
+    </dgm:linClrLst>
+    <dgm:effectClrLst/>
+    <dgm:txLinClrLst/>
+    <dgm:txFillClrLst/>
+    <dgm:txEffectClrLst/>
+  </dgm:styleLbl>
+  <dgm:styleLbl name="alignNode1">
+    <dgm:fillClrLst meth="repeat">
+      <a:schemeClr val="accent1"/>
+    </dgm:fillClrLst>
+    <dgm:linClrLst meth="repeat">
+      <a:schemeClr val="accent1"/>
+    </dgm:linClrLst>
+    <dgm:effectClrLst/>
+    <dgm:txLinClrLst/>
+    <dgm:txFillClrLst/>
+    <dgm:txEffectClrLst/>
+  </dgm:styleLbl>
+  <dgm:styleLbl name="node1">
+    <dgm:fillClrLst meth="repeat">
+      <a:schemeClr val="accent1"/>
+    </dgm:fillClrLst>
+    <dgm:linClrLst meth="repeat">
+      <a:schemeClr val="lt1"/>
+    </dgm:linClrLst>
+    <dgm:effectClrLst/>
+    <dgm:txLinClrLst/>
+    <dgm:txFillClrLst/>
+    <dgm:txEffectClrLst/>
+  </dgm:styleLbl>
+  <dgm:styleLbl name="lnNode1">
+    <dgm:fillClrLst meth="repeat">
+      <a:schemeClr val="accent1"/>
+    </dgm:fillClrLst>
+    <dgm:linClrLst meth="repeat">
+      <a:schemeClr val="lt1"/>
+    </dgm:linClrLst>
+    <dgm:effectClrLst/>
+    <dgm:txLinClrLst/>
+    <dgm:txFillClrLst/>
+    <dgm:txEffectClrLst/>
+  </dgm:styleLbl>
+  <dgm:styleLbl name="vennNode1">
+    <dgm:fillClrLst meth="repeat">
+      <a:schemeClr val="accent1">
+        <a:alpha val="50000"/>
+      </a:schemeClr>
+    </dgm:fillClrLst>
+    <dgm:linClrLst meth="repeat">
+      <a:schemeClr val="lt1"/>
+    </dgm:linClrLst>
+    <dgm:effectClrLst/>
+    <dgm:txLinClrLst/>
+    <dgm:txFillClrLst/>
+    <dgm:txEffectClrLst/>
+  </dgm:styleLbl>
+  <dgm:styleLbl name="node2">
+    <dgm:fillClrLst meth="repeat">
+      <a:schemeClr val="accent1"/>
+    </dgm:fillClrLst>
+    <dgm:linClrLst meth="repeat">
+      <a:schemeClr val="lt1"/>
+    </dgm:linClrLst>
+    <dgm:effectClrLst/>
+    <dgm:txLinClrLst/>
+    <dgm:txFillClrLst/>
+    <dgm:txEffectClrLst/>
+  </dgm:styleLbl>
+  <dgm:styleLbl name="node3">
+    <dgm:fillClrLst meth="repeat">
+      <a:schemeClr val="accent1"/>
+    </dgm:fillClrLst>
+    <dgm:linClrLst meth="repeat">
+      <a:schemeClr val="lt1"/>
+    </dgm:linClrLst>
+    <dgm:effectClrLst/>
+    <dgm:txLinClrLst/>
+    <dgm:txFillClrLst/>
+    <dgm:txEffectClrLst/>
+  </dgm:styleLbl>
+  <dgm:styleLbl name="node4">
+    <dgm:fillClrLst meth="repeat">
+      <a:schemeClr val="accent1"/>
+    </dgm:fillClrLst>
+    <dgm:linClrLst meth="repeat">
+      <a:schemeClr val="lt1"/>
+    </dgm:linClrLst>
+    <dgm:effectClrLst/>
+    <dgm:txLinClrLst/>
+    <dgm:txFillClrLst/>
+    <dgm:txEffectClrLst/>
+  </dgm:styleLbl>
+  <dgm:styleLbl name="fgImgPlace1">
+    <dgm:fillClrLst meth="repeat">
+      <a:schemeClr val="accent1">
+        <a:tint val="50000"/>
+      </a:schemeClr>
+    </dgm:fillClrLst>
+    <dgm:linClrLst meth="repeat">
+      <a:schemeClr val="lt1"/>
+    </dgm:linClrLst>
+    <dgm:effectClrLst/>
+    <dgm:txLinClrLst/>
+    <dgm:txFillClrLst meth="repeat">
+      <a:schemeClr val="lt1"/>
+    </dgm:txFillClrLst>
+    <dgm:txEffectClrLst/>
+  </dgm:styleLbl>
+  <dgm:styleLbl name="alignImgPlace1">
+    <dgm:fillClrLst meth="repeat">
+      <a:schemeClr val="accent1">
+        <a:tint val="50000"/>
+      </a:schemeClr>
+    </dgm:fillClrLst>
+    <dgm:linClrLst meth="repeat">
+      <a:schemeClr val="lt1"/>
+    </dgm:linClrLst>
+    <dgm:effectClrLst/>
+    <dgm:txLinClrLst/>
+    <dgm:txFillClrLst meth="repeat">
+      <a:schemeClr val="lt1"/>
+    </dgm:txFillClrLst>
+    <dgm:txEffectClrLst/>
+  </dgm:styleLbl>
+  <dgm:styleLbl name="bgImgPlace1">
+    <dgm:fillClrLst meth="repeat">
+      <a:schemeClr val="accent1">
+        <a:tint val="50000"/>
+      </a:schemeClr>
+    </dgm:fillClrLst>
+    <dgm:linClrLst meth="repeat">
+      <a:schemeClr val="lt1"/>
+    </dgm:linClrLst>
+    <dgm:effectClrLst/>
+    <dgm:txLinClrLst/>
+    <dgm:txFillClrLst meth="repeat">
+      <a:schemeClr val="lt1"/>
+    </dgm:txFillClrLst>
+    <dgm:txEffectClrLst/>
+  </dgm:styleLbl>
+  <dgm:styleLbl name="sibTrans2D1">
+    <dgm:fillClrLst meth="repeat">
+      <a:schemeClr val="accent1">
+        <a:tint val="60000"/>
+      </a:schemeClr>
+    </dgm:fillClrLst>
+    <dgm:linClrLst meth="repeat">
+      <a:schemeClr val="accent1">
+        <a:tint val="60000"/>
+      </a:schemeClr>
+    </dgm:linClrLst>
+    <dgm:effectClrLst/>
+    <dgm:txLinClrLst/>
+    <dgm:txFillClrLst/>
+    <dgm:txEffectClrLst/>
+  </dgm:styleLbl>
+  <dgm:styleLbl name="fgSibTrans2D1">
+    <dgm:fillClrLst meth="repeat">
+      <a:schemeClr val="accent1">
+        <a:tint val="60000"/>
+      </a:schemeClr>
+    </dgm:fillClrLst>
+    <dgm:linClrLst meth="repeat">
+      <a:schemeClr val="accent1">
+        <a:tint val="60000"/>
+      </a:schemeClr>
+    </dgm:linClrLst>
+    <dgm:effectClrLst/>
+    <dgm:txLinClrLst/>
+    <dgm:txFillClrLst/>
+    <dgm:txEffectClrLst/>
+  </dgm:styleLbl>
+  <dgm:styleLbl name="bgSibTrans2D1">
+    <dgm:fillClrLst meth="repeat">
+      <a:schemeClr val="accent1">
+        <a:tint val="60000"/>
+      </a:schemeClr>
+    </dgm:fillClrLst>
+    <dgm:linClrLst meth="repeat">
+      <a:schemeClr val="accent1">
+        <a:tint val="60000"/>
+      </a:schemeClr>
+    </dgm:linClrLst>
+    <dgm:effectClrLst/>
+    <dgm:txLinClrLst/>
+    <dgm:txFillClrLst/>
+    <dgm:txEffectClrLst/>
+  </dgm:styleLbl>
+  <dgm:styleLbl name="sibTrans1D1">
+    <dgm:fillClrLst meth="repeat">
+      <a:schemeClr val="accent1"/>
+    </dgm:fillClrLst>
+    <dgm:linClrLst meth="repeat">
+      <a:schemeClr val="accent1"/>
+    </dgm:linClrLst>
+    <dgm:effectClrLst/>
+    <dgm:txLinClrLst/>
+    <dgm:txFillClrLst meth="repeat">
+      <a:schemeClr val="tx1"/>
+    </dgm:txFillClrLst>
+    <dgm:txEffectClrLst/>
+  </dgm:styleLbl>
+  <dgm:styleLbl name="callout">
+    <dgm:fillClrLst meth="repeat">
+      <a:schemeClr val="accent1"/>
+    </dgm:fillClrLst>
+    <dgm:linClrLst meth="repeat">
+      <a:schemeClr val="accent1">
+        <a:tint val="50000"/>
+      </a:schemeClr>
+    </dgm:linClrLst>
+    <dgm:effectClrLst/>
+    <dgm:txLinClrLst/>
+    <dgm:txFillClrLst meth="repeat">
+      <a:schemeClr val="tx1"/>
+    </dgm:txFillClrLst>
+    <dgm:txEffectClrLst/>
+  </dgm:styleLbl>
+  <dgm:styleLbl name="asst0">
+    <dgm:fillClrLst meth="repeat">
+      <a:schemeClr val="accent1"/>
+    </dgm:fillClrLst>
+    <dgm:linClrLst meth="repeat">
+      <a:schemeClr val="lt1"/>
+    </dgm:linClrLst>
+    <dgm:effectClrLst/>
+    <dgm:txLinClrLst/>
+    <dgm:txFillClrLst/>
+    <dgm:txEffectClrLst/>
+  </dgm:styleLbl>
+  <dgm:styleLbl name="asst1">
+    <dgm:fillClrLst meth="repeat">
+      <a:schemeClr val="accent1"/>
+    </dgm:fillClrLst>
+    <dgm:linClrLst meth="repeat">
+      <a:schemeClr val="lt1"/>
+    </dgm:linClrLst>
+    <dgm:effectClrLst/>
+    <dgm:txLinClrLst/>
+    <dgm:txFillClrLst/>
+    <dgm:txEffectClrLst/>
+  </dgm:styleLbl>
+  <dgm:styleLbl name="asst2">
+    <dgm:fillClrLst meth="repeat">
+      <a:schemeClr val="accent1"/>
+    </dgm:fillClrLst>
+    <dgm:linClrLst meth="repeat">
+      <a:schemeClr val="lt1"/>
+    </dgm:linClrLst>
+    <dgm:effectClrLst/>
+    <dgm:txLinClrLst/>
+    <dgm:txFillClrLst/>
+    <dgm:txEffectClrLst/>
+  </dgm:styleLbl>
+  <dgm:styleLbl name="asst3">
+    <dgm:fillClrLst meth="repeat">
+      <a:schemeClr val="accent1"/>
+    </dgm:fillClrLst>
+    <dgm:linClrLst meth="repeat">
+      <a:schemeClr val="lt1"/>
+    </dgm:linClrLst>
+    <dgm:effectClrLst/>
+    <dgm:txLinClrLst/>
+    <dgm:txFillClrLst/>
+    <dgm:txEffectClrLst/>
+  </dgm:styleLbl>
+  <dgm:styleLbl name="asst4">
+    <dgm:fillClrLst meth="repeat">
+      <a:schemeClr val="accent1"/>
+    </dgm:fillClrLst>
+    <dgm:linClrLst meth="repeat">
+      <a:schemeClr val="lt1"/>
+    </dgm:linClrLst>
+    <dgm:effectClrLst/>
+    <dgm:txLinClrLst/>
+    <dgm:txFillClrLst/>
+    <dgm:txEffectClrLst/>
+  </dgm:styleLbl>
+  <dgm:styleLbl name="parChTrans2D1">
+    <dgm:fillClrLst meth="repeat">
+      <a:schemeClr val="accent1">
+        <a:tint val="60000"/>
+      </a:schemeClr>
+    </dgm:fillClrLst>
+    <dgm:linClrLst meth="repeat">
+      <a:schemeClr val="accent1">
+        <a:tint val="60000"/>
+      </a:schemeClr>
+    </dgm:linClrLst>
+    <dgm:effectClrLst/>
+    <dgm:txLinClrLst/>
+    <dgm:txFillClrLst meth="repeat">
+      <a:schemeClr val="lt1"/>
+    </dgm:txFillClrLst>
+    <dgm:txEffectClrLst/>
+  </dgm:styleLbl>
+  <dgm:styleLbl name="parChTrans2D2">
+    <dgm:fillClrLst meth="repeat">
+      <a:schemeClr val="accent1"/>
+    </dgm:fillClrLst>
+    <dgm:linClrLst meth="repeat">
+      <a:schemeClr val="accent1"/>
+    </dgm:linClrLst>
+    <dgm:effectClrLst/>
+    <dgm:txLinClrLst/>
+    <dgm:txFillClrLst meth="repeat">
+      <a:schemeClr val="lt1"/>
+    </dgm:txFillClrLst>
+    <dgm:txEffectClrLst/>
+  </dgm:styleLbl>
+  <dgm:styleLbl name="parChTrans2D3">
+    <dgm:fillClrLst meth="repeat">
+      <a:schemeClr val="accent1"/>
+    </dgm:fillClrLst>
+    <dgm:linClrLst meth="repeat">
+      <a:schemeClr val="accent1"/>
+    </dgm:linClrLst>
+    <dgm:effectClrLst/>
+    <dgm:txLinClrLst/>
+    <dgm:txFillClrLst meth="repeat">
+      <a:schemeClr val="lt1"/>
+    </dgm:txFillClrLst>
+    <dgm:txEffectClrLst/>
+  </dgm:styleLbl>
+  <dgm:styleLbl name="parChTrans2D4">
+    <dgm:fillClrLst meth="repeat">
+      <a:schemeClr val="accent1"/>
+    </dgm:fillClrLst>
+    <dgm:linClrLst meth="repeat">
+      <a:schemeClr val="accent1"/>
+    </dgm:linClrLst>
+    <dgm:effectClrLst/>
+    <dgm:txLinClrLst/>
+    <dgm:txFillClrLst meth="repeat">
+      <a:schemeClr val="lt1"/>
+    </dgm:txFillClrLst>
+    <dgm:txEffectClrLst/>
+  </dgm:styleLbl>
+  <dgm:styleLbl name="parChTrans1D1">
+    <dgm:fillClrLst meth="repeat">
+      <a:schemeClr val="accent1"/>
+    </dgm:fillClrLst>
+    <dgm:linClrLst meth="repeat">
+      <a:schemeClr val="accent1">
+        <a:shade val="60000"/>
+      </a:schemeClr>
+    </dgm:linClrLst>
+    <dgm:effectClrLst/>
+    <dgm:txLinClrLst/>
+    <dgm:txFillClrLst meth="repeat">
+      <a:schemeClr val="tx1"/>
+    </dgm:txFillClrLst>
+    <dgm:txEffectClrLst/>
+  </dgm:styleLbl>
+  <dgm:styleLbl name="parChTrans1D2">
+    <dgm:fillClrLst meth="repeat">
+      <a:schemeClr val="accent1"/>
+    </dgm:fillClrLst>
+    <dgm:linClrLst meth="repeat">
+      <a:schemeClr val="accent1">
+        <a:shade val="60000"/>
+      </a:schemeClr>
+    </dgm:linClrLst>
+    <dgm:effectClrLst/>
+    <dgm:txLinClrLst/>
+    <dgm:txFillClrLst meth="repeat">
+      <a:schemeClr val="tx1"/>
+    </dgm:txFillClrLst>
+    <dgm:txEffectClrLst/>
+  </dgm:styleLbl>
+  <dgm:styleLbl name="parChTrans1D3">
+    <dgm:fillClrLst meth="repeat">
+      <a:schemeClr val="accent1"/>
+    </dgm:fillClrLst>
+    <dgm:linClrLst meth="repeat">
+      <a:schemeClr val="accent1">
+        <a:shade val="80000"/>
+      </a:schemeClr>
+    </dgm:linClrLst>
+    <dgm:effectClrLst/>
+    <dgm:txLinClrLst/>
+    <dgm:txFillClrLst meth="repeat">
+      <a:schemeClr val="tx1"/>
+    </dgm:txFillClrLst>
+    <dgm:txEffectClrLst/>
+  </dgm:styleLbl>
+  <dgm:styleLbl name="parChTrans1D4">
+    <dgm:fillClrLst meth="repeat">
+      <a:schemeClr val="accent1"/>
+    </dgm:fillClrLst>
+    <dgm:linClrLst meth="repeat">
+      <a:schemeClr val="accent1">
+        <a:shade val="80000"/>
+      </a:schemeClr>
+    </dgm:linClrLst>
+    <dgm:effectClrLst/>
+    <dgm:txLinClrLst/>
+    <dgm:txFillClrLst meth="repeat">
+      <a:schemeClr val="tx1"/>
+    </dgm:txFillClrLst>
+    <dgm:txEffectClrLst/>
+  </dgm:styleLbl>
+  <dgm:styleLbl name="fgAcc1">
+    <dgm:fillClrLst meth="repeat">
+      <a:schemeClr val="lt1">
+        <a:alpha val="90000"/>
+      </a:schemeClr>
+    </dgm:fillClrLst>
+    <dgm:linClrLst meth="repeat">
+      <a:schemeClr val="accent1"/>
+    </dgm:linClrLst>
+    <dgm:effectClrLst/>
+    <dgm:txLinClrLst/>
+    <dgm:txFillClrLst meth="repeat">
+      <a:schemeClr val="dk1"/>
+    </dgm:txFillClrLst>
+    <dgm:txEffectClrLst/>
+  </dgm:styleLbl>
+  <dgm:styleLbl name="conFgAcc1">
+    <dgm:fillClrLst meth="repeat">
+      <a:schemeClr val="lt1">
+        <a:alpha val="90000"/>
+      </a:schemeClr>
+    </dgm:fillClrLst>
+    <dgm:linClrLst meth="repeat">
+      <a:schemeClr val="accent1"/>
+    </dgm:linClrLst>
+    <dgm:effectClrLst/>
+    <dgm:txLinClrLst/>
+    <dgm:txFillClrLst meth="repeat">
+      <a:schemeClr val="dk1"/>
+    </dgm:txFillClrLst>
+    <dgm:txEffectClrLst/>
+  </dgm:styleLbl>
+  <dgm:styleLbl name="alignAcc1">
+    <dgm:fillClrLst meth="repeat">
+      <a:schemeClr val="lt1">
+        <a:alpha val="90000"/>
+      </a:schemeClr>
+    </dgm:fillClrLst>
+    <dgm:linClrLst meth="repeat">
+      <a:schemeClr val="accent1"/>
+    </dgm:linClrLst>
+    <dgm:effectClrLst/>
+    <dgm:txLinClrLst/>
+    <dgm:txFillClrLst meth="repeat">
+      <a:schemeClr val="dk1"/>
+    </dgm:txFillClrLst>
+    <dgm:txEffectClrLst/>
+  </dgm:styleLbl>
+  <dgm:styleLbl name="trAlignAcc1">
+    <dgm:fillClrLst meth="repeat">
+      <a:schemeClr val="lt1">
+        <a:alpha val="40000"/>
+      </a:schemeClr>
+    </dgm:fillClrLst>
+    <dgm:linClrLst meth="repeat">
+      <a:schemeClr val="accent1"/>
+    </dgm:linClrLst>
+    <dgm:effectClrLst/>
+    <dgm:txLinClrLst/>
+    <dgm:txFillClrLst meth="repeat">
+      <a:schemeClr val="dk1"/>
+    </dgm:txFillClrLst>
+    <dgm:txEffectClrLst/>
+  </dgm:styleLbl>
+  <dgm:styleLbl name="bgAcc1">
+    <dgm:fillClrLst meth="repeat">
+      <a:schemeClr val="lt1">
+        <a:alpha val="90000"/>
+      </a:schemeClr>
+    </dgm:fillClrLst>
+    <dgm:linClrLst meth="repeat">
+      <a:schemeClr val="accent1"/>
+    </dgm:linClrLst>
+    <dgm:effectClrLst/>
+    <dgm:txLinClrLst/>
+    <dgm:txFillClrLst meth="repeat">
+      <a:schemeClr val="dk1"/>
+    </dgm:txFillClrLst>
+    <dgm:txEffectClrLst/>
+  </dgm:styleLbl>
+  <dgm:styleLbl name="solidFgAcc1">
+    <dgm:fillClrLst meth="repeat">
+      <a:schemeClr val="lt1"/>
+    </dgm:fillClrLst>
+    <dgm:linClrLst meth="repeat">
+      <a:schemeClr val="accent1"/>
+    </dgm:linClrLst>
+    <dgm:effectClrLst/>
+    <dgm:txLinClrLst/>
+    <dgm:txFillClrLst meth="repeat">
+      <a:schemeClr val="dk1"/>
+    </dgm:txFillClrLst>
+    <dgm:txEffectClrLst/>
+  </dgm:styleLbl>
+  <dgm:styleLbl name="solidAlignAcc1">
+    <dgm:fillClrLst meth="repeat">
+      <a:schemeClr val="lt1"/>
+    </dgm:fillClrLst>
+    <dgm:linClrLst meth="repeat">
+      <a:schemeClr val="accent1"/>
+    </dgm:linClrLst>
+    <dgm:effectClrLst/>
+    <dgm:txLinClrLst/>
+    <dgm:txFillClrLst meth="repeat">
+      <a:schemeClr val="dk1"/>
+    </dgm:txFillClrLst>
+    <dgm:txEffectClrLst/>
+  </dgm:styleLbl>
+  <dgm:styleLbl name="solidBgAcc1">
+    <dgm:fillClrLst meth="repeat">
+      <a:schemeClr val="lt1"/>
+    </dgm:fillClrLst>
+    <dgm:linClrLst meth="repeat">
+      <a:schemeClr val="accent1"/>
+    </dgm:linClrLst>
+    <dgm:effectClrLst/>
+    <dgm:txLinClrLst/>
+    <dgm:txFillClrLst meth="repeat">
+      <a:schemeClr val="dk1"/>
+    </dgm:txFillClrLst>
+    <dgm:txEffectClrLst/>
+  </dgm:styleLbl>
+  <dgm:styleLbl name="fgAccFollowNode1">
+    <dgm:fillClrLst meth="repeat">
+      <a:schemeClr val="accent1">
+        <a:alpha val="90000"/>
+        <a:tint val="40000"/>
+      </a:schemeClr>
+    </dgm:fillClrLst>
+    <dgm:linClrLst meth="repeat">
+      <a:schemeClr val="accent1">
+        <a:alpha val="90000"/>
+        <a:tint val="40000"/>
+      </a:schemeClr>
+    </dgm:linClrLst>
+    <dgm:effectClrLst/>
+    <dgm:txLinClrLst/>
+    <dgm:txFillClrLst meth="repeat">
+      <a:schemeClr val="dk1"/>
+    </dgm:txFillClrLst>
+    <dgm:txEffectClrLst/>
+  </dgm:styleLbl>
+  <dgm:styleLbl name="alignAccFollowNode1">
+    <dgm:fillClrLst meth="repeat">
+      <a:schemeClr val="accent1">
+        <a:alpha val="90000"/>
+        <a:tint val="40000"/>
+      </a:schemeClr>
+    </dgm:fillClrLst>
+    <dgm:linClrLst meth="repeat">
+      <a:schemeClr val="accent1">
+        <a:alpha val="90000"/>
+        <a:tint val="40000"/>
+      </a:schemeClr>
+    </dgm:linClrLst>
+    <dgm:effectClrLst/>
+    <dgm:txLinClrLst/>
+    <dgm:txFillClrLst meth="repeat">
+      <a:schemeClr val="dk1"/>
+    </dgm:txFillClrLst>
+    <dgm:txEffectClrLst/>
+  </dgm:styleLbl>
+  <dgm:styleLbl name="bgAccFollowNode1">
+    <dgm:fillClrLst meth="repeat">
+      <a:schemeClr val="accent1">
+        <a:alpha val="90000"/>
+        <a:tint val="40000"/>
+      </a:schemeClr>
+    </dgm:fillClrLst>
+    <dgm:linClrLst meth="repeat">
+      <a:schemeClr val="accent1">
+        <a:alpha val="90000"/>
+        <a:tint val="40000"/>
+      </a:schemeClr>
+    </dgm:linClrLst>
+    <dgm:effectClrLst/>
+    <dgm:txLinClrLst/>
+    <dgm:txFillClrLst meth="repeat">
+      <a:schemeClr val="dk1"/>
+    </dgm:txFillClrLst>
+    <dgm:txEffectClrLst/>
+  </dgm:styleLbl>
+  <dgm:styleLbl name="fgAcc0">
+    <dgm:fillClrLst meth="repeat">
+      <a:schemeClr val="lt1">
+        <a:alpha val="90000"/>
+      </a:schemeClr>
+    </dgm:fillClrLst>
+    <dgm:linClrLst meth="repeat">
+      <a:schemeClr val="accent1"/>
+    </dgm:linClrLst>
+    <dgm:effectClrLst/>
+    <dgm:txLinClrLst/>
+    <dgm:txFillClrLst meth="repeat">
+      <a:schemeClr val="dk1"/>
+    </dgm:txFillClrLst>
+    <dgm:txEffectClrLst/>
+  </dgm:styleLbl>
+  <dgm:styleLbl name="fgAcc2">
+    <dgm:fillClrLst meth="repeat">
+      <a:schemeClr val="lt1">
+        <a:alpha val="90000"/>
+      </a:schemeClr>
+    </dgm:fillClrLst>
+    <dgm:linClrLst meth="repeat">
+      <a:schemeClr val="accent1"/>
+    </dgm:linClrLst>
+    <dgm:effectClrLst/>
+    <dgm:txLinClrLst/>
+    <dgm:txFillClrLst meth="repeat">
+      <a:schemeClr val="dk1"/>
+    </dgm:txFillClrLst>
+    <dgm:txEffectClrLst/>
+  </dgm:styleLbl>
+  <dgm:styleLbl name="fgAcc3">
+    <dgm:fillClrLst meth="repeat">
+      <a:schemeClr val="lt1">
+        <a:alpha val="90000"/>
+      </a:schemeClr>
+    </dgm:fillClrLst>
+    <dgm:linClrLst meth="repeat">
+      <a:schemeClr val="accent1"/>
+    </dgm:linClrLst>
+    <dgm:effectClrLst/>
+    <dgm:txLinClrLst/>
+    <dgm:txFillClrLst meth="repeat">
+      <a:schemeClr val="dk1"/>
+    </dgm:txFillClrLst>
+    <dgm:txEffectClrLst/>
+  </dgm:styleLbl>
+  <dgm:styleLbl name="fgAcc4">
+    <dgm:fillClrLst meth="repeat">
+      <a:schemeClr val="lt1">
+        <a:alpha val="90000"/>
+      </a:schemeClr>
+    </dgm:fillClrLst>
+    <dgm:linClrLst meth="repeat">
+      <a:schemeClr val="accent1"/>
+    </dgm:linClrLst>
+    <dgm:effectClrLst/>
+    <dgm:txLinClrLst/>
+    <dgm:txFillClrLst meth="repeat">
+      <a:schemeClr val="dk1"/>
+    </dgm:txFillClrLst>
+    <dgm:txEffectClrLst/>
+  </dgm:styleLbl>
+  <dgm:styleLbl name="bgShp">
+    <dgm:fillClrLst meth="repeat">
+      <a:schemeClr val="accent1">
+        <a:tint val="40000"/>
+      </a:schemeClr>
+    </dgm:fillClrLst>
+    <dgm:linClrLst meth="repeat">
+      <a:schemeClr val="accent1"/>
+    </dgm:linClrLst>
+    <dgm:effectClrLst/>
+    <dgm:txLinClrLst/>
+    <dgm:txFillClrLst meth="repeat">
+      <a:schemeClr val="dk1"/>
+    </dgm:txFillClrLst>
+    <dgm:txEffectClrLst/>
+  </dgm:styleLbl>
+  <dgm:styleLbl name="dkBgShp">
+    <dgm:fillClrLst meth="repeat">
+      <a:schemeClr val="accent1">
+        <a:shade val="80000"/>
+      </a:schemeClr>
+    </dgm:fillClrLst>
+    <dgm:linClrLst meth="repeat">
+      <a:schemeClr val="accent1"/>
+    </dgm:linClrLst>
+    <dgm:effectClrLst/>
+    <dgm:txLinClrLst/>
+    <dgm:txFillClrLst meth="repeat">
+      <a:schemeClr val="lt1"/>
+    </dgm:txFillClrLst>
+    <dgm:txEffectClrLst/>
+  </dgm:styleLbl>
+  <dgm:styleLbl name="trBgShp">
+    <dgm:fillClrLst meth="repeat">
+      <a:schemeClr val="accent1">
+        <a:tint val="50000"/>
+        <a:alpha val="40000"/>
+      </a:schemeClr>
+    </dgm:fillClrLst>
+    <dgm:linClrLst meth="repeat">
+      <a:schemeClr val="accent1"/>
+    </dgm:linClrLst>
+    <dgm:effectClrLst/>
+    <dgm:txLinClrLst/>
+    <dgm:txFillClrLst meth="repeat">
+      <a:schemeClr val="lt1"/>
+    </dgm:txFillClrLst>
+    <dgm:txEffectClrLst/>
+  </dgm:styleLbl>
+  <dgm:styleLbl name="fgShp">
+    <dgm:fillClrLst meth="repeat">
+      <a:schemeClr val="accent1">
+        <a:tint val="60000"/>
+      </a:schemeClr>
+    </dgm:fillClrLst>
+    <dgm:linClrLst meth="repeat">
+      <a:schemeClr val="lt1"/>
+    </dgm:linClrLst>
+    <dgm:effectClrLst/>
+    <dgm:txLinClrLst/>
+    <dgm:txFillClrLst meth="repeat">
+      <a:schemeClr val="dk1"/>
+    </dgm:txFillClrLst>
+    <dgm:txEffectClrLst/>
+  </dgm:styleLbl>
+  <dgm:styleLbl name="revTx">
+    <dgm:fillClrLst meth="repeat">
+      <a:schemeClr val="lt1">
+        <a:alpha val="0"/>
+      </a:schemeClr>
+    </dgm:fillClrLst>
+    <dgm:linClrLst meth="repeat">
+      <a:schemeClr val="dk1">
+        <a:alpha val="0"/>
+      </a:schemeClr>
+    </dgm:linClrLst>
+    <dgm:effectClrLst/>
+    <dgm:txLinClrLst/>
+    <dgm:txFillClrLst meth="repeat">
+      <a:schemeClr val="tx1"/>
+    </dgm:txFillClrLst>
+    <dgm:txEffectClrLst/>
+  </dgm:styleLbl>
+</dgm:colorsDef>
+</file>
+
 <file path=ppt/diagrams/data1.xml><?xml version="1.0" encoding="utf-8"?>
+<dgm:dataModel xmlns:dgm="http://schemas.openxmlformats.org/drawingml/2006/diagram" xmlns:a="http://schemas.openxmlformats.org/drawingml/2006/main">
+  <dgm:ptLst>
+    <dgm:pt modelId="{6AB417A5-41C6-423B-810D-2028EE8FCA8E}" type="doc">
+      <dgm:prSet loTypeId="urn:microsoft.com/office/officeart/2005/8/layout/vList2" loCatId="list" qsTypeId="urn:microsoft.com/office/officeart/2005/8/quickstyle/simple1" qsCatId="simple" csTypeId="urn:microsoft.com/office/officeart/2005/8/colors/accent1_2" csCatId="accent1" phldr="1"/>
+      <dgm:spPr/>
+      <dgm:t>
+        <a:bodyPr/>
+        <a:lstStyle/>
+        <a:p>
+          <a:endParaRPr lang="en-US"/>
+        </a:p>
+      </dgm:t>
+    </dgm:pt>
+    <dgm:pt modelId="{33AA78F7-9D4C-47C4-87E7-472578E13110}">
+      <dgm:prSet/>
+      <dgm:spPr/>
+      <dgm:t>
+        <a:bodyPr/>
+        <a:lstStyle/>
+        <a:p>
+          <a:r>
+            <a:rPr lang="zh-CN" altLang="en-US" dirty="0"/>
+            <a:t>方案</a:t>
+          </a:r>
+          <a:r>
+            <a:rPr lang="en-US" altLang="zh-CN" dirty="0"/>
+            <a:t>1</a:t>
+          </a:r>
+          <a:r>
+            <a:rPr lang="zh-CN" altLang="en-US" dirty="0"/>
+            <a:t>：可以提前准备好基因组文件</a:t>
+          </a:r>
+          <a:r>
+            <a:rPr lang="en-US" altLang="zh-CN" dirty="0" err="1"/>
+            <a:t>abbr.genome.fa</a:t>
+          </a:r>
+          <a:r>
+            <a:rPr lang="zh-CN" altLang="en-US" dirty="0"/>
+            <a:t>和基因组注释文件</a:t>
+          </a:r>
+          <a:r>
+            <a:rPr lang="en-US" altLang="zh-CN" dirty="0"/>
+            <a:t>abbr.genome.gff3</a:t>
+          </a:r>
+          <a:endParaRPr lang="en-US" dirty="0"/>
+        </a:p>
+      </dgm:t>
+    </dgm:pt>
+    <dgm:pt modelId="{6A046887-B350-434B-8D9A-C43811455B16}" type="parTrans" cxnId="{78C6010B-2E09-4023-8F71-6C4164BAA937}">
+      <dgm:prSet/>
+      <dgm:spPr/>
+      <dgm:t>
+        <a:bodyPr/>
+        <a:lstStyle/>
+        <a:p>
+          <a:endParaRPr lang="en-US"/>
+        </a:p>
+      </dgm:t>
+    </dgm:pt>
+    <dgm:pt modelId="{F3E8A790-6352-470E-9EB3-1829F694FB8B}" type="sibTrans" cxnId="{78C6010B-2E09-4023-8F71-6C4164BAA937}">
+      <dgm:prSet/>
+      <dgm:spPr/>
+      <dgm:t>
+        <a:bodyPr/>
+        <a:lstStyle/>
+        <a:p>
+          <a:endParaRPr lang="en-US"/>
+        </a:p>
+      </dgm:t>
+    </dgm:pt>
+    <dgm:pt modelId="{C9749518-350C-4704-9278-FB8B3FDA11C0}">
+      <dgm:prSet/>
+      <dgm:spPr/>
+      <dgm:t>
+        <a:bodyPr/>
+        <a:lstStyle/>
+        <a:p>
+          <a:r>
+            <a:rPr lang="en-US" altLang="zh-CN" dirty="0"/>
+            <a:t>bash genome2cdspep.sh </a:t>
+          </a:r>
+          <a:r>
+            <a:rPr lang="en-US" altLang="zh-CN" dirty="0" err="1"/>
+            <a:t>abbr.genome.fa</a:t>
+          </a:r>
+          <a:r>
+            <a:rPr lang="en-US" altLang="zh-CN" dirty="0"/>
+            <a:t> abbr.genome.gff3 </a:t>
+          </a:r>
+          <a:r>
+            <a:rPr lang="en-US" altLang="zh-CN" dirty="0" err="1"/>
+            <a:t>genome_abbr</a:t>
+          </a:r>
+          <a:r>
+            <a:rPr lang="en-US" altLang="zh-CN" dirty="0"/>
+            <a:t> .</a:t>
+          </a:r>
+          <a:endParaRPr lang="en-US" dirty="0"/>
+        </a:p>
+      </dgm:t>
+    </dgm:pt>
+    <dgm:pt modelId="{20242720-A807-40DE-A028-0687479F084D}" type="parTrans" cxnId="{781BD1CB-35EE-4031-ACFE-C5FF4A477223}">
+      <dgm:prSet/>
+      <dgm:spPr/>
+      <dgm:t>
+        <a:bodyPr/>
+        <a:lstStyle/>
+        <a:p>
+          <a:endParaRPr lang="en-US"/>
+        </a:p>
+      </dgm:t>
+    </dgm:pt>
+    <dgm:pt modelId="{0D99616E-0666-4153-A68D-DFB57D0007A2}" type="sibTrans" cxnId="{781BD1CB-35EE-4031-ACFE-C5FF4A477223}">
+      <dgm:prSet/>
+      <dgm:spPr/>
+      <dgm:t>
+        <a:bodyPr/>
+        <a:lstStyle/>
+        <a:p>
+          <a:endParaRPr lang="en-US"/>
+        </a:p>
+      </dgm:t>
+    </dgm:pt>
+    <dgm:pt modelId="{F51B2D01-0837-4EFA-84BB-4F141AE102F9}">
+      <dgm:prSet/>
+      <dgm:spPr/>
+      <dgm:t>
+        <a:bodyPr/>
+        <a:lstStyle/>
+        <a:p>
+          <a:r>
+            <a:rPr lang="zh-CN" altLang="en-US" dirty="0"/>
+            <a:t>方案</a:t>
+          </a:r>
+          <a:r>
+            <a:rPr lang="en-US" altLang="zh-CN" dirty="0"/>
+            <a:t>2</a:t>
+          </a:r>
+          <a:r>
+            <a:rPr lang="zh-CN" altLang="en-US" dirty="0"/>
+            <a:t>：如果已经有基因组蛋白文件</a:t>
+          </a:r>
+          <a:r>
+            <a:rPr lang="en-US" altLang="zh-CN" dirty="0" err="1"/>
+            <a:t>pep.fa</a:t>
+          </a:r>
+          <a:r>
+            <a:rPr lang="zh-CN" altLang="en-US" dirty="0"/>
+            <a:t>和</a:t>
+          </a:r>
+          <a:r>
+            <a:rPr lang="en-US" altLang="zh-CN" dirty="0" err="1"/>
+            <a:t>cds</a:t>
+          </a:r>
+          <a:r>
+            <a:rPr lang="zh-CN" altLang="en-US" dirty="0"/>
+            <a:t>序列</a:t>
+          </a:r>
+          <a:r>
+            <a:rPr lang="en-US" altLang="zh-CN" dirty="0" err="1"/>
+            <a:t>cds.fa</a:t>
+          </a:r>
+          <a:r>
+            <a:rPr lang="en-US" altLang="zh-CN" dirty="0"/>
+            <a:t>,</a:t>
+          </a:r>
+          <a:r>
+            <a:rPr lang="zh-CN" altLang="en-US" dirty="0"/>
+            <a:t>则可以直接运行</a:t>
+          </a:r>
+          <a:r>
+            <a:rPr lang="en-US" altLang="zh-CN" dirty="0"/>
+            <a:t>KK4D.sh</a:t>
+          </a:r>
+          <a:endParaRPr lang="en-US" dirty="0"/>
+        </a:p>
+      </dgm:t>
+    </dgm:pt>
+    <dgm:pt modelId="{71266ABD-477C-4FCD-B679-2FEF3F8DAB96}" type="parTrans" cxnId="{6DA6A22D-ED2F-4676-947D-9B610CA3D4BE}">
+      <dgm:prSet/>
+      <dgm:spPr/>
+      <dgm:t>
+        <a:bodyPr/>
+        <a:lstStyle/>
+        <a:p>
+          <a:endParaRPr lang="en-US"/>
+        </a:p>
+      </dgm:t>
+    </dgm:pt>
+    <dgm:pt modelId="{4C6F6140-DAA2-4EAB-B31C-26450847897C}" type="sibTrans" cxnId="{6DA6A22D-ED2F-4676-947D-9B610CA3D4BE}">
+      <dgm:prSet/>
+      <dgm:spPr/>
+      <dgm:t>
+        <a:bodyPr/>
+        <a:lstStyle/>
+        <a:p>
+          <a:endParaRPr lang="en-US"/>
+        </a:p>
+      </dgm:t>
+    </dgm:pt>
+    <dgm:pt modelId="{D9276F54-A0B7-4155-B5D2-D5B1301EEC8A}">
+      <dgm:prSet/>
+      <dgm:spPr/>
+      <dgm:t>
+        <a:bodyPr/>
+        <a:lstStyle/>
+        <a:p>
+          <a:r>
+            <a:rPr lang="zh-CN" altLang="en-US" dirty="0"/>
+            <a:t>使用方法如下：</a:t>
+          </a:r>
+          <a:endParaRPr lang="en-US" dirty="0"/>
+        </a:p>
+      </dgm:t>
+    </dgm:pt>
+    <dgm:pt modelId="{07EDA35B-8A08-4F68-800B-6C69B96C7E9C}" type="parTrans" cxnId="{29708E2A-99CD-4145-842D-EFD7469DF806}">
+      <dgm:prSet/>
+      <dgm:spPr/>
+      <dgm:t>
+        <a:bodyPr/>
+        <a:lstStyle/>
+        <a:p>
+          <a:endParaRPr lang="zh-CN" altLang="en-US"/>
+        </a:p>
+      </dgm:t>
+    </dgm:pt>
+    <dgm:pt modelId="{F0738C0A-4CA3-44F1-9BBD-7CB05AAC7F28}" type="sibTrans" cxnId="{29708E2A-99CD-4145-842D-EFD7469DF806}">
+      <dgm:prSet/>
+      <dgm:spPr/>
+      <dgm:t>
+        <a:bodyPr/>
+        <a:lstStyle/>
+        <a:p>
+          <a:endParaRPr lang="zh-CN" altLang="en-US"/>
+        </a:p>
+      </dgm:t>
+    </dgm:pt>
+    <dgm:pt modelId="{E151DB3E-9634-40F6-BFCC-DA2FFEA2BB1B}">
+      <dgm:prSet/>
+      <dgm:spPr/>
+      <dgm:t>
+        <a:bodyPr/>
+        <a:lstStyle/>
+        <a:p>
+          <a:r>
+            <a:rPr lang="en-US" altLang="zh-CN" dirty="0"/>
+            <a:t>bash genome2cdspep.sh GCF_000816755.2_Araip1.1_genomic.fa GCF_000816755.2_Araip1.1_genomic.gff </a:t>
+          </a:r>
+          <a:r>
+            <a:rPr lang="en-US" altLang="zh-CN" dirty="0" err="1"/>
+            <a:t>A.ipaensis</a:t>
+          </a:r>
+          <a:r>
+            <a:rPr lang="en-US" altLang="zh-CN" dirty="0"/>
+            <a:t> .</a:t>
+          </a:r>
+          <a:endParaRPr lang="en-US" dirty="0"/>
+        </a:p>
+      </dgm:t>
+    </dgm:pt>
+    <dgm:pt modelId="{566E548F-3086-424E-AB63-73C740FA76D0}" type="parTrans" cxnId="{F7112E54-2530-4349-B78D-E75571C55854}">
+      <dgm:prSet/>
+      <dgm:spPr/>
+      <dgm:t>
+        <a:bodyPr/>
+        <a:lstStyle/>
+        <a:p>
+          <a:endParaRPr lang="zh-CN" altLang="en-US"/>
+        </a:p>
+      </dgm:t>
+    </dgm:pt>
+    <dgm:pt modelId="{B3555B5F-CC59-48AF-BC8F-D0655B5F661D}" type="sibTrans" cxnId="{F7112E54-2530-4349-B78D-E75571C55854}">
+      <dgm:prSet/>
+      <dgm:spPr/>
+      <dgm:t>
+        <a:bodyPr/>
+        <a:lstStyle/>
+        <a:p>
+          <a:endParaRPr lang="zh-CN" altLang="en-US"/>
+        </a:p>
+      </dgm:t>
+    </dgm:pt>
+    <dgm:pt modelId="{8E1FE211-394A-4060-89BC-4674C2F698E1}">
+      <dgm:prSet/>
+      <dgm:spPr/>
+      <dgm:t>
+        <a:bodyPr/>
+        <a:lstStyle/>
+        <a:p>
+          <a:r>
+            <a:rPr lang="zh-CN" altLang="en-US" dirty="0"/>
+            <a:t>这个例子输出的文件是</a:t>
+          </a:r>
+          <a:r>
+            <a:rPr lang="en-US" altLang="zh-CN" dirty="0" err="1"/>
+            <a:t>A.ipaensis.pep</a:t>
+          </a:r>
+          <a:r>
+            <a:rPr lang="zh-CN" altLang="en-US" dirty="0"/>
+            <a:t>和</a:t>
+          </a:r>
+          <a:r>
+            <a:rPr lang="en-US" altLang="zh-CN" dirty="0" err="1"/>
+            <a:t>A.ipaensis.cds</a:t>
+          </a:r>
+          <a:r>
+            <a:rPr lang="en-US" altLang="zh-CN" dirty="0"/>
+            <a:t>,</a:t>
+          </a:r>
+          <a:r>
+            <a:rPr lang="zh-CN" altLang="en-US" dirty="0"/>
+            <a:t>这</a:t>
+          </a:r>
+          <a:r>
+            <a:rPr lang="en-US" altLang="zh-CN" dirty="0"/>
+            <a:t>2</a:t>
+          </a:r>
+          <a:r>
+            <a:rPr lang="zh-CN" altLang="en-US" dirty="0"/>
+            <a:t>个文件就是</a:t>
+          </a:r>
+          <a:r>
+            <a:rPr lang="en-US" altLang="zh-CN" dirty="0"/>
+            <a:t>KK4D</a:t>
+          </a:r>
+          <a:r>
+            <a:rPr lang="zh-CN" altLang="en-US" dirty="0"/>
+            <a:t>需要的输入文件。</a:t>
+          </a:r>
+          <a:endParaRPr lang="en-US" dirty="0"/>
+        </a:p>
+      </dgm:t>
+    </dgm:pt>
+    <dgm:pt modelId="{686061FC-994C-4DC8-B680-54DCE3A6C6D8}" type="parTrans" cxnId="{6BCB6C46-E9C3-464A-9812-1186BEB57F6D}">
+      <dgm:prSet/>
+      <dgm:spPr/>
+      <dgm:t>
+        <a:bodyPr/>
+        <a:lstStyle/>
+        <a:p>
+          <a:endParaRPr lang="zh-CN" altLang="en-US"/>
+        </a:p>
+      </dgm:t>
+    </dgm:pt>
+    <dgm:pt modelId="{3A372826-F273-4970-A39B-8E45BA7A2770}" type="sibTrans" cxnId="{6BCB6C46-E9C3-464A-9812-1186BEB57F6D}">
+      <dgm:prSet/>
+      <dgm:spPr/>
+      <dgm:t>
+        <a:bodyPr/>
+        <a:lstStyle/>
+        <a:p>
+          <a:endParaRPr lang="zh-CN" altLang="en-US"/>
+        </a:p>
+      </dgm:t>
+    </dgm:pt>
+    <dgm:pt modelId="{95BB8395-53FE-4815-8D44-A99A5524C1BD}" type="pres">
+      <dgm:prSet presAssocID="{6AB417A5-41C6-423B-810D-2028EE8FCA8E}" presName="linear" presStyleCnt="0">
+        <dgm:presLayoutVars>
+          <dgm:animLvl val="lvl"/>
+          <dgm:resizeHandles val="exact"/>
+        </dgm:presLayoutVars>
+      </dgm:prSet>
+      <dgm:spPr/>
+    </dgm:pt>
+    <dgm:pt modelId="{DFC2EA23-2F0B-41F7-8424-D77E0AFD5422}" type="pres">
+      <dgm:prSet presAssocID="{33AA78F7-9D4C-47C4-87E7-472578E13110}" presName="parentText" presStyleLbl="node1" presStyleIdx="0" presStyleCnt="2">
+        <dgm:presLayoutVars>
+          <dgm:chMax val="0"/>
+          <dgm:bulletEnabled val="1"/>
+        </dgm:presLayoutVars>
+      </dgm:prSet>
+      <dgm:spPr/>
+    </dgm:pt>
+    <dgm:pt modelId="{440307F3-04E2-4823-9738-43E5817342E4}" type="pres">
+      <dgm:prSet presAssocID="{33AA78F7-9D4C-47C4-87E7-472578E13110}" presName="childText" presStyleLbl="revTx" presStyleIdx="0" presStyleCnt="1">
+        <dgm:presLayoutVars>
+          <dgm:bulletEnabled val="1"/>
+        </dgm:presLayoutVars>
+      </dgm:prSet>
+      <dgm:spPr/>
+    </dgm:pt>
+    <dgm:pt modelId="{64EEFA14-8E3D-4A29-9B4C-724DBBE25DFE}" type="pres">
+      <dgm:prSet presAssocID="{F51B2D01-0837-4EFA-84BB-4F141AE102F9}" presName="parentText" presStyleLbl="node1" presStyleIdx="1" presStyleCnt="2">
+        <dgm:presLayoutVars>
+          <dgm:chMax val="0"/>
+          <dgm:bulletEnabled val="1"/>
+        </dgm:presLayoutVars>
+      </dgm:prSet>
+      <dgm:spPr/>
+    </dgm:pt>
+  </dgm:ptLst>
+  <dgm:cxnLst>
+    <dgm:cxn modelId="{8B0FE104-49F7-4D3B-8F79-99A24AEBABE2}" type="presOf" srcId="{33AA78F7-9D4C-47C4-87E7-472578E13110}" destId="{DFC2EA23-2F0B-41F7-8424-D77E0AFD5422}" srcOrd="0" destOrd="0" presId="urn:microsoft.com/office/officeart/2005/8/layout/vList2"/>
+    <dgm:cxn modelId="{78C6010B-2E09-4023-8F71-6C4164BAA937}" srcId="{6AB417A5-41C6-423B-810D-2028EE8FCA8E}" destId="{33AA78F7-9D4C-47C4-87E7-472578E13110}" srcOrd="0" destOrd="0" parTransId="{6A046887-B350-434B-8D9A-C43811455B16}" sibTransId="{F3E8A790-6352-470E-9EB3-1829F694FB8B}"/>
+    <dgm:cxn modelId="{EBC78129-5D77-4330-AE76-70C6ECE22FDD}" type="presOf" srcId="{6AB417A5-41C6-423B-810D-2028EE8FCA8E}" destId="{95BB8395-53FE-4815-8D44-A99A5524C1BD}" srcOrd="0" destOrd="0" presId="urn:microsoft.com/office/officeart/2005/8/layout/vList2"/>
+    <dgm:cxn modelId="{29708E2A-99CD-4145-842D-EFD7469DF806}" srcId="{33AA78F7-9D4C-47C4-87E7-472578E13110}" destId="{D9276F54-A0B7-4155-B5D2-D5B1301EEC8A}" srcOrd="0" destOrd="0" parTransId="{07EDA35B-8A08-4F68-800B-6C69B96C7E9C}" sibTransId="{F0738C0A-4CA3-44F1-9BBD-7CB05AAC7F28}"/>
+    <dgm:cxn modelId="{6DA6A22D-ED2F-4676-947D-9B610CA3D4BE}" srcId="{6AB417A5-41C6-423B-810D-2028EE8FCA8E}" destId="{F51B2D01-0837-4EFA-84BB-4F141AE102F9}" srcOrd="1" destOrd="0" parTransId="{71266ABD-477C-4FCD-B679-2FEF3F8DAB96}" sibTransId="{4C6F6140-DAA2-4EAB-B31C-26450847897C}"/>
+    <dgm:cxn modelId="{6BCB6C46-E9C3-464A-9812-1186BEB57F6D}" srcId="{33AA78F7-9D4C-47C4-87E7-472578E13110}" destId="{8E1FE211-394A-4060-89BC-4674C2F698E1}" srcOrd="3" destOrd="0" parTransId="{686061FC-994C-4DC8-B680-54DCE3A6C6D8}" sibTransId="{3A372826-F273-4970-A39B-8E45BA7A2770}"/>
+    <dgm:cxn modelId="{F7112E54-2530-4349-B78D-E75571C55854}" srcId="{33AA78F7-9D4C-47C4-87E7-472578E13110}" destId="{E151DB3E-9634-40F6-BFCC-DA2FFEA2BB1B}" srcOrd="2" destOrd="0" parTransId="{566E548F-3086-424E-AB63-73C740FA76D0}" sibTransId="{B3555B5F-CC59-48AF-BC8F-D0655B5F661D}"/>
+    <dgm:cxn modelId="{2AA23B77-A5D0-4D10-B401-FCCCDED99364}" type="presOf" srcId="{E151DB3E-9634-40F6-BFCC-DA2FFEA2BB1B}" destId="{440307F3-04E2-4823-9738-43E5817342E4}" srcOrd="0" destOrd="2" presId="urn:microsoft.com/office/officeart/2005/8/layout/vList2"/>
+    <dgm:cxn modelId="{DD3D1793-F393-4D60-8F41-66AE2049A7F2}" type="presOf" srcId="{8E1FE211-394A-4060-89BC-4674C2F698E1}" destId="{440307F3-04E2-4823-9738-43E5817342E4}" srcOrd="0" destOrd="3" presId="urn:microsoft.com/office/officeart/2005/8/layout/vList2"/>
+    <dgm:cxn modelId="{DA30DDA5-7979-4D99-975C-175FD6AB4F99}" type="presOf" srcId="{C9749518-350C-4704-9278-FB8B3FDA11C0}" destId="{440307F3-04E2-4823-9738-43E5817342E4}" srcOrd="0" destOrd="1" presId="urn:microsoft.com/office/officeart/2005/8/layout/vList2"/>
+    <dgm:cxn modelId="{CF0A5BAE-70A1-4777-8E4D-66A68C9CCC81}" type="presOf" srcId="{F51B2D01-0837-4EFA-84BB-4F141AE102F9}" destId="{64EEFA14-8E3D-4A29-9B4C-724DBBE25DFE}" srcOrd="0" destOrd="0" presId="urn:microsoft.com/office/officeart/2005/8/layout/vList2"/>
+    <dgm:cxn modelId="{781BD1CB-35EE-4031-ACFE-C5FF4A477223}" srcId="{33AA78F7-9D4C-47C4-87E7-472578E13110}" destId="{C9749518-350C-4704-9278-FB8B3FDA11C0}" srcOrd="1" destOrd="0" parTransId="{20242720-A807-40DE-A028-0687479F084D}" sibTransId="{0D99616E-0666-4153-A68D-DFB57D0007A2}"/>
+    <dgm:cxn modelId="{B76884E9-F000-4817-A4E1-ABFB90FDF1AC}" type="presOf" srcId="{D9276F54-A0B7-4155-B5D2-D5B1301EEC8A}" destId="{440307F3-04E2-4823-9738-43E5817342E4}" srcOrd="0" destOrd="0" presId="urn:microsoft.com/office/officeart/2005/8/layout/vList2"/>
+    <dgm:cxn modelId="{C25D17F9-6F06-4072-B9A2-A522CBBCE001}" type="presParOf" srcId="{95BB8395-53FE-4815-8D44-A99A5524C1BD}" destId="{DFC2EA23-2F0B-41F7-8424-D77E0AFD5422}" srcOrd="0" destOrd="0" presId="urn:microsoft.com/office/officeart/2005/8/layout/vList2"/>
+    <dgm:cxn modelId="{248C6150-9EAB-47F1-A3A1-F1D109241CFD}" type="presParOf" srcId="{95BB8395-53FE-4815-8D44-A99A5524C1BD}" destId="{440307F3-04E2-4823-9738-43E5817342E4}" srcOrd="1" destOrd="0" presId="urn:microsoft.com/office/officeart/2005/8/layout/vList2"/>
+    <dgm:cxn modelId="{C3321713-D939-4B69-99A8-7794BD37AA9D}" type="presParOf" srcId="{95BB8395-53FE-4815-8D44-A99A5524C1BD}" destId="{64EEFA14-8E3D-4A29-9B4C-724DBBE25DFE}" srcOrd="2" destOrd="0" presId="urn:microsoft.com/office/officeart/2005/8/layout/vList2"/>
+  </dgm:cxnLst>
+  <dgm:bg/>
+  <dgm:whole/>
+  <dgm:extLst>
+    <a:ext uri="http://schemas.microsoft.com/office/drawing/2008/diagram">
+      <dsp:dataModelExt xmlns:dsp="http://schemas.microsoft.com/office/drawing/2008/diagram" relId="rId6" minVer="http://schemas.openxmlformats.org/drawingml/2006/diagram"/>
+    </a:ext>
+  </dgm:extLst>
+</dgm:dataModel>
+</file>
+
+<file path=ppt/diagrams/data2.xml><?xml version="1.0" encoding="utf-8"?>
 <dgm:dataModel xmlns:dgm="http://schemas.openxmlformats.org/drawingml/2006/diagram" xmlns:a="http://schemas.openxmlformats.org/drawingml/2006/main">
   <dgm:ptLst>
     <dgm:pt modelId="{6AB417A5-41C6-423B-810D-2028EE8FCA8E}" type="doc">
@@ -1594,6 +2762,412 @@
 </file>
 
 <file path=ppt/diagrams/drawing1.xml><?xml version="1.0" encoding="utf-8"?>
+<dsp:drawing xmlns:dgm="http://schemas.openxmlformats.org/drawingml/2006/diagram" xmlns:dsp="http://schemas.microsoft.com/office/drawing/2008/diagram" xmlns:a="http://schemas.openxmlformats.org/drawingml/2006/main">
+  <dsp:spTree>
+    <dsp:nvGrpSpPr>
+      <dsp:cNvPr id="0" name=""/>
+      <dsp:cNvGrpSpPr/>
+    </dsp:nvGrpSpPr>
+    <dsp:grpSpPr/>
+    <dsp:sp modelId="{DFC2EA23-2F0B-41F7-8424-D77E0AFD5422}">
+      <dsp:nvSpPr>
+        <dsp:cNvPr id="0" name=""/>
+        <dsp:cNvSpPr/>
+      </dsp:nvSpPr>
+      <dsp:spPr>
+        <a:xfrm>
+          <a:off x="0" y="40844"/>
+          <a:ext cx="6413663" cy="1490580"/>
+        </a:xfrm>
+        <a:prstGeom prst="roundRect">
+          <a:avLst/>
+        </a:prstGeom>
+        <a:solidFill>
+          <a:schemeClr val="accent1">
+            <a:hueOff val="0"/>
+            <a:satOff val="0"/>
+            <a:lumOff val="0"/>
+            <a:alphaOff val="0"/>
+          </a:schemeClr>
+        </a:solidFill>
+        <a:ln w="15875" cap="flat" cmpd="sng" algn="ctr">
+          <a:solidFill>
+            <a:schemeClr val="lt1">
+              <a:hueOff val="0"/>
+              <a:satOff val="0"/>
+              <a:lumOff val="0"/>
+              <a:alphaOff val="0"/>
+            </a:schemeClr>
+          </a:solidFill>
+          <a:prstDash val="solid"/>
+        </a:ln>
+        <a:effectLst/>
+      </dsp:spPr>
+      <dsp:style>
+        <a:lnRef idx="2">
+          <a:scrgbClr r="0" g="0" b="0"/>
+        </a:lnRef>
+        <a:fillRef idx="1">
+          <a:scrgbClr r="0" g="0" b="0"/>
+        </a:fillRef>
+        <a:effectRef idx="0">
+          <a:scrgbClr r="0" g="0" b="0"/>
+        </a:effectRef>
+        <a:fontRef idx="minor">
+          <a:schemeClr val="lt1"/>
+        </a:fontRef>
+      </dsp:style>
+      <dsp:txBody>
+        <a:bodyPr spcFirstLastPara="0" vert="horz" wrap="square" lIns="99060" tIns="99060" rIns="99060" bIns="99060" numCol="1" spcCol="1270" anchor="ctr" anchorCtr="0">
+          <a:noAutofit/>
+        </a:bodyPr>
+        <a:lstStyle/>
+        <a:p>
+          <a:pPr marL="0" lvl="0" indent="0" algn="l" defTabSz="1155700">
+            <a:lnSpc>
+              <a:spcPct val="90000"/>
+            </a:lnSpc>
+            <a:spcBef>
+              <a:spcPct val="0"/>
+            </a:spcBef>
+            <a:spcAft>
+              <a:spcPct val="35000"/>
+            </a:spcAft>
+            <a:buNone/>
+          </a:pPr>
+          <a:r>
+            <a:rPr lang="zh-CN" altLang="en-US" sz="2600" kern="1200" dirty="0"/>
+            <a:t>方案</a:t>
+          </a:r>
+          <a:r>
+            <a:rPr lang="en-US" altLang="zh-CN" sz="2600" kern="1200" dirty="0"/>
+            <a:t>1</a:t>
+          </a:r>
+          <a:r>
+            <a:rPr lang="zh-CN" altLang="en-US" sz="2600" kern="1200" dirty="0"/>
+            <a:t>：可以提前准备好基因组文件</a:t>
+          </a:r>
+          <a:r>
+            <a:rPr lang="en-US" altLang="zh-CN" sz="2600" kern="1200" dirty="0" err="1"/>
+            <a:t>abbr.genome.fa</a:t>
+          </a:r>
+          <a:r>
+            <a:rPr lang="zh-CN" altLang="en-US" sz="2600" kern="1200" dirty="0"/>
+            <a:t>和基因组注释文件</a:t>
+          </a:r>
+          <a:r>
+            <a:rPr lang="en-US" altLang="zh-CN" sz="2600" kern="1200" dirty="0"/>
+            <a:t>abbr.genome.gff3</a:t>
+          </a:r>
+          <a:endParaRPr lang="en-US" sz="2600" kern="1200" dirty="0"/>
+        </a:p>
+      </dsp:txBody>
+      <dsp:txXfrm>
+        <a:off x="72764" y="113608"/>
+        <a:ext cx="6268135" cy="1345052"/>
+      </dsp:txXfrm>
+    </dsp:sp>
+    <dsp:sp modelId="{440307F3-04E2-4823-9738-43E5817342E4}">
+      <dsp:nvSpPr>
+        <dsp:cNvPr id="0" name=""/>
+        <dsp:cNvSpPr/>
+      </dsp:nvSpPr>
+      <dsp:spPr>
+        <a:xfrm>
+          <a:off x="0" y="1531424"/>
+          <a:ext cx="6413663" cy="2583360"/>
+        </a:xfrm>
+        <a:prstGeom prst="rect">
+          <a:avLst/>
+        </a:prstGeom>
+        <a:noFill/>
+        <a:ln>
+          <a:noFill/>
+        </a:ln>
+        <a:effectLst/>
+      </dsp:spPr>
+      <dsp:style>
+        <a:lnRef idx="0">
+          <a:scrgbClr r="0" g="0" b="0"/>
+        </a:lnRef>
+        <a:fillRef idx="0">
+          <a:scrgbClr r="0" g="0" b="0"/>
+        </a:fillRef>
+        <a:effectRef idx="0">
+          <a:scrgbClr r="0" g="0" b="0"/>
+        </a:effectRef>
+        <a:fontRef idx="minor"/>
+      </dsp:style>
+      <dsp:txBody>
+        <a:bodyPr spcFirstLastPara="0" vert="horz" wrap="square" lIns="203634" tIns="33020" rIns="184912" bIns="33020" numCol="1" spcCol="1270" anchor="t" anchorCtr="0">
+          <a:noAutofit/>
+        </a:bodyPr>
+        <a:lstStyle/>
+        <a:p>
+          <a:pPr marL="228600" lvl="1" indent="-228600" algn="l" defTabSz="889000">
+            <a:lnSpc>
+              <a:spcPct val="90000"/>
+            </a:lnSpc>
+            <a:spcBef>
+              <a:spcPct val="0"/>
+            </a:spcBef>
+            <a:spcAft>
+              <a:spcPct val="20000"/>
+            </a:spcAft>
+            <a:buChar char="•"/>
+          </a:pPr>
+          <a:r>
+            <a:rPr lang="zh-CN" altLang="en-US" sz="2000" kern="1200" dirty="0"/>
+            <a:t>使用方法如下：</a:t>
+          </a:r>
+          <a:endParaRPr lang="en-US" sz="2000" kern="1200" dirty="0"/>
+        </a:p>
+        <a:p>
+          <a:pPr marL="228600" lvl="1" indent="-228600" algn="l" defTabSz="889000">
+            <a:lnSpc>
+              <a:spcPct val="90000"/>
+            </a:lnSpc>
+            <a:spcBef>
+              <a:spcPct val="0"/>
+            </a:spcBef>
+            <a:spcAft>
+              <a:spcPct val="20000"/>
+            </a:spcAft>
+            <a:buChar char="•"/>
+          </a:pPr>
+          <a:r>
+            <a:rPr lang="en-US" altLang="zh-CN" sz="2000" kern="1200" dirty="0"/>
+            <a:t>bash genome2cdspep.sh </a:t>
+          </a:r>
+          <a:r>
+            <a:rPr lang="en-US" altLang="zh-CN" sz="2000" kern="1200" dirty="0" err="1"/>
+            <a:t>abbr.genome.fa</a:t>
+          </a:r>
+          <a:r>
+            <a:rPr lang="en-US" altLang="zh-CN" sz="2000" kern="1200" dirty="0"/>
+            <a:t> abbr.genome.gff3 </a:t>
+          </a:r>
+          <a:r>
+            <a:rPr lang="en-US" altLang="zh-CN" sz="2000" kern="1200" dirty="0" err="1"/>
+            <a:t>genome_abbr</a:t>
+          </a:r>
+          <a:r>
+            <a:rPr lang="en-US" altLang="zh-CN" sz="2000" kern="1200" dirty="0"/>
+            <a:t> .</a:t>
+          </a:r>
+          <a:endParaRPr lang="en-US" sz="2000" kern="1200" dirty="0"/>
+        </a:p>
+        <a:p>
+          <a:pPr marL="228600" lvl="1" indent="-228600" algn="l" defTabSz="889000">
+            <a:lnSpc>
+              <a:spcPct val="90000"/>
+            </a:lnSpc>
+            <a:spcBef>
+              <a:spcPct val="0"/>
+            </a:spcBef>
+            <a:spcAft>
+              <a:spcPct val="20000"/>
+            </a:spcAft>
+            <a:buChar char="•"/>
+          </a:pPr>
+          <a:r>
+            <a:rPr lang="en-US" altLang="zh-CN" sz="2000" kern="1200" dirty="0"/>
+            <a:t>bash genome2cdspep.sh GCF_000816755.2_Araip1.1_genomic.fa GCF_000816755.2_Araip1.1_genomic.gff </a:t>
+          </a:r>
+          <a:r>
+            <a:rPr lang="en-US" altLang="zh-CN" sz="2000" kern="1200" dirty="0" err="1"/>
+            <a:t>A.ipaensis</a:t>
+          </a:r>
+          <a:r>
+            <a:rPr lang="en-US" altLang="zh-CN" sz="2000" kern="1200" dirty="0"/>
+            <a:t> .</a:t>
+          </a:r>
+          <a:endParaRPr lang="en-US" sz="2000" kern="1200" dirty="0"/>
+        </a:p>
+        <a:p>
+          <a:pPr marL="228600" lvl="1" indent="-228600" algn="l" defTabSz="889000">
+            <a:lnSpc>
+              <a:spcPct val="90000"/>
+            </a:lnSpc>
+            <a:spcBef>
+              <a:spcPct val="0"/>
+            </a:spcBef>
+            <a:spcAft>
+              <a:spcPct val="20000"/>
+            </a:spcAft>
+            <a:buChar char="•"/>
+          </a:pPr>
+          <a:r>
+            <a:rPr lang="zh-CN" altLang="en-US" sz="2000" kern="1200" dirty="0"/>
+            <a:t>这个例子输出的文件是</a:t>
+          </a:r>
+          <a:r>
+            <a:rPr lang="en-US" altLang="zh-CN" sz="2000" kern="1200" dirty="0" err="1"/>
+            <a:t>A.ipaensis.pep</a:t>
+          </a:r>
+          <a:r>
+            <a:rPr lang="zh-CN" altLang="en-US" sz="2000" kern="1200" dirty="0"/>
+            <a:t>和</a:t>
+          </a:r>
+          <a:r>
+            <a:rPr lang="en-US" altLang="zh-CN" sz="2000" kern="1200" dirty="0" err="1"/>
+            <a:t>A.ipaensis.cds</a:t>
+          </a:r>
+          <a:r>
+            <a:rPr lang="en-US" altLang="zh-CN" sz="2000" kern="1200" dirty="0"/>
+            <a:t>,</a:t>
+          </a:r>
+          <a:r>
+            <a:rPr lang="zh-CN" altLang="en-US" sz="2000" kern="1200" dirty="0"/>
+            <a:t>这</a:t>
+          </a:r>
+          <a:r>
+            <a:rPr lang="en-US" altLang="zh-CN" sz="2000" kern="1200" dirty="0"/>
+            <a:t>2</a:t>
+          </a:r>
+          <a:r>
+            <a:rPr lang="zh-CN" altLang="en-US" sz="2000" kern="1200" dirty="0"/>
+            <a:t>个文件就是</a:t>
+          </a:r>
+          <a:r>
+            <a:rPr lang="en-US" altLang="zh-CN" sz="2000" kern="1200" dirty="0"/>
+            <a:t>KK4D</a:t>
+          </a:r>
+          <a:r>
+            <a:rPr lang="zh-CN" altLang="en-US" sz="2000" kern="1200" dirty="0"/>
+            <a:t>需要的输入文件。</a:t>
+          </a:r>
+          <a:endParaRPr lang="en-US" sz="2000" kern="1200" dirty="0"/>
+        </a:p>
+      </dsp:txBody>
+      <dsp:txXfrm>
+        <a:off x="0" y="1531424"/>
+        <a:ext cx="6413663" cy="2583360"/>
+      </dsp:txXfrm>
+    </dsp:sp>
+    <dsp:sp modelId="{64EEFA14-8E3D-4A29-9B4C-724DBBE25DFE}">
+      <dsp:nvSpPr>
+        <dsp:cNvPr id="0" name=""/>
+        <dsp:cNvSpPr/>
+      </dsp:nvSpPr>
+      <dsp:spPr>
+        <a:xfrm>
+          <a:off x="0" y="4114784"/>
+          <a:ext cx="6413663" cy="1490580"/>
+        </a:xfrm>
+        <a:prstGeom prst="roundRect">
+          <a:avLst/>
+        </a:prstGeom>
+        <a:solidFill>
+          <a:schemeClr val="accent1">
+            <a:hueOff val="0"/>
+            <a:satOff val="0"/>
+            <a:lumOff val="0"/>
+            <a:alphaOff val="0"/>
+          </a:schemeClr>
+        </a:solidFill>
+        <a:ln w="15875" cap="flat" cmpd="sng" algn="ctr">
+          <a:solidFill>
+            <a:schemeClr val="lt1">
+              <a:hueOff val="0"/>
+              <a:satOff val="0"/>
+              <a:lumOff val="0"/>
+              <a:alphaOff val="0"/>
+            </a:schemeClr>
+          </a:solidFill>
+          <a:prstDash val="solid"/>
+        </a:ln>
+        <a:effectLst/>
+      </dsp:spPr>
+      <dsp:style>
+        <a:lnRef idx="2">
+          <a:scrgbClr r="0" g="0" b="0"/>
+        </a:lnRef>
+        <a:fillRef idx="1">
+          <a:scrgbClr r="0" g="0" b="0"/>
+        </a:fillRef>
+        <a:effectRef idx="0">
+          <a:scrgbClr r="0" g="0" b="0"/>
+        </a:effectRef>
+        <a:fontRef idx="minor">
+          <a:schemeClr val="lt1"/>
+        </a:fontRef>
+      </dsp:style>
+      <dsp:txBody>
+        <a:bodyPr spcFirstLastPara="0" vert="horz" wrap="square" lIns="99060" tIns="99060" rIns="99060" bIns="99060" numCol="1" spcCol="1270" anchor="ctr" anchorCtr="0">
+          <a:noAutofit/>
+        </a:bodyPr>
+        <a:lstStyle/>
+        <a:p>
+          <a:pPr marL="0" lvl="0" indent="0" algn="l" defTabSz="1155700">
+            <a:lnSpc>
+              <a:spcPct val="90000"/>
+            </a:lnSpc>
+            <a:spcBef>
+              <a:spcPct val="0"/>
+            </a:spcBef>
+            <a:spcAft>
+              <a:spcPct val="35000"/>
+            </a:spcAft>
+            <a:buNone/>
+          </a:pPr>
+          <a:r>
+            <a:rPr lang="zh-CN" altLang="en-US" sz="2600" kern="1200" dirty="0"/>
+            <a:t>方案</a:t>
+          </a:r>
+          <a:r>
+            <a:rPr lang="en-US" altLang="zh-CN" sz="2600" kern="1200" dirty="0"/>
+            <a:t>2</a:t>
+          </a:r>
+          <a:r>
+            <a:rPr lang="zh-CN" altLang="en-US" sz="2600" kern="1200" dirty="0"/>
+            <a:t>：如果已经有基因组蛋白文件</a:t>
+          </a:r>
+          <a:r>
+            <a:rPr lang="en-US" altLang="zh-CN" sz="2600" kern="1200" dirty="0" err="1"/>
+            <a:t>pep.fa</a:t>
+          </a:r>
+          <a:r>
+            <a:rPr lang="zh-CN" altLang="en-US" sz="2600" kern="1200" dirty="0"/>
+            <a:t>和</a:t>
+          </a:r>
+          <a:r>
+            <a:rPr lang="en-US" altLang="zh-CN" sz="2600" kern="1200" dirty="0" err="1"/>
+            <a:t>cds</a:t>
+          </a:r>
+          <a:r>
+            <a:rPr lang="zh-CN" altLang="en-US" sz="2600" kern="1200" dirty="0"/>
+            <a:t>序列</a:t>
+          </a:r>
+          <a:r>
+            <a:rPr lang="en-US" altLang="zh-CN" sz="2600" kern="1200" dirty="0" err="1"/>
+            <a:t>cds.fa</a:t>
+          </a:r>
+          <a:r>
+            <a:rPr lang="en-US" altLang="zh-CN" sz="2600" kern="1200" dirty="0"/>
+            <a:t>,</a:t>
+          </a:r>
+          <a:r>
+            <a:rPr lang="zh-CN" altLang="en-US" sz="2600" kern="1200" dirty="0"/>
+            <a:t>则可以直接运行</a:t>
+          </a:r>
+          <a:r>
+            <a:rPr lang="en-US" altLang="zh-CN" sz="2600" kern="1200" dirty="0"/>
+            <a:t>KK4D.sh</a:t>
+          </a:r>
+          <a:endParaRPr lang="en-US" sz="2600" kern="1200" dirty="0"/>
+        </a:p>
+      </dsp:txBody>
+      <dsp:txXfrm>
+        <a:off x="72764" y="4187548"/>
+        <a:ext cx="6268135" cy="1345052"/>
+      </dsp:txXfrm>
+    </dsp:sp>
+  </dsp:spTree>
+</dsp:drawing>
+</file>
+
+<file path=ppt/diagrams/drawing2.xml><?xml version="1.0" encoding="utf-8"?>
 <dsp:drawing xmlns:dgm="http://schemas.openxmlformats.org/drawingml/2006/diagram" xmlns:dsp="http://schemas.microsoft.com/office/drawing/2008/diagram" xmlns:a="http://schemas.openxmlformats.org/drawingml/2006/main">
   <dsp:spTree>
     <dsp:nvGrpSpPr>
@@ -2760,7 +4334,1208 @@
 </dgm:layoutDef>
 </file>
 
+<file path=ppt/diagrams/layout2.xml><?xml version="1.0" encoding="utf-8"?>
+<dgm:layoutDef xmlns:dgm="http://schemas.openxmlformats.org/drawingml/2006/diagram" xmlns:a="http://schemas.openxmlformats.org/drawingml/2006/main" uniqueId="urn:microsoft.com/office/officeart/2005/8/layout/vList2">
+  <dgm:title val=""/>
+  <dgm:desc val=""/>
+  <dgm:catLst>
+    <dgm:cat type="list" pri="3000"/>
+    <dgm:cat type="convert" pri="1000"/>
+  </dgm:catLst>
+  <dgm:sampData>
+    <dgm:dataModel>
+      <dgm:ptLst>
+        <dgm:pt modelId="0" type="doc"/>
+        <dgm:pt modelId="1">
+          <dgm:prSet phldr="1"/>
+        </dgm:pt>
+        <dgm:pt modelId="11">
+          <dgm:prSet phldr="1"/>
+        </dgm:pt>
+        <dgm:pt modelId="2">
+          <dgm:prSet phldr="1"/>
+        </dgm:pt>
+        <dgm:pt modelId="21">
+          <dgm:prSet phldr="1"/>
+        </dgm:pt>
+      </dgm:ptLst>
+      <dgm:cxnLst>
+        <dgm:cxn modelId="4" srcId="0" destId="1" srcOrd="0" destOrd="0"/>
+        <dgm:cxn modelId="5" srcId="0" destId="2" srcOrd="1" destOrd="0"/>
+        <dgm:cxn modelId="12" srcId="1" destId="11" srcOrd="0" destOrd="0"/>
+        <dgm:cxn modelId="23" srcId="2" destId="21" srcOrd="0" destOrd="0"/>
+      </dgm:cxnLst>
+      <dgm:bg/>
+      <dgm:whole/>
+    </dgm:dataModel>
+  </dgm:sampData>
+  <dgm:styleData>
+    <dgm:dataModel>
+      <dgm:ptLst>
+        <dgm:pt modelId="0" type="doc"/>
+        <dgm:pt modelId="1"/>
+        <dgm:pt modelId="2"/>
+      </dgm:ptLst>
+      <dgm:cxnLst>
+        <dgm:cxn modelId="3" srcId="0" destId="1" srcOrd="0" destOrd="0"/>
+        <dgm:cxn modelId="4" srcId="0" destId="2" srcOrd="1" destOrd="0"/>
+      </dgm:cxnLst>
+      <dgm:bg/>
+      <dgm:whole/>
+    </dgm:dataModel>
+  </dgm:styleData>
+  <dgm:clrData>
+    <dgm:dataModel>
+      <dgm:ptLst>
+        <dgm:pt modelId="0" type="doc"/>
+        <dgm:pt modelId="1"/>
+        <dgm:pt modelId="2"/>
+        <dgm:pt modelId="3"/>
+        <dgm:pt modelId="4"/>
+      </dgm:ptLst>
+      <dgm:cxnLst>
+        <dgm:cxn modelId="5" srcId="0" destId="1" srcOrd="0" destOrd="0"/>
+        <dgm:cxn modelId="6" srcId="0" destId="2" srcOrd="1" destOrd="0"/>
+        <dgm:cxn modelId="7" srcId="0" destId="3" srcOrd="2" destOrd="0"/>
+        <dgm:cxn modelId="8" srcId="0" destId="4" srcOrd="3" destOrd="0"/>
+      </dgm:cxnLst>
+      <dgm:bg/>
+      <dgm:whole/>
+    </dgm:dataModel>
+  </dgm:clrData>
+  <dgm:layoutNode name="linear">
+    <dgm:varLst>
+      <dgm:animLvl val="lvl"/>
+      <dgm:resizeHandles val="exact"/>
+    </dgm:varLst>
+    <dgm:alg type="lin">
+      <dgm:param type="linDir" val="fromT"/>
+      <dgm:param type="vertAlign" val="mid"/>
+    </dgm:alg>
+    <dgm:shape xmlns:r="http://schemas.openxmlformats.org/officeDocument/2006/relationships" r:blip="">
+      <dgm:adjLst/>
+    </dgm:shape>
+    <dgm:presOf/>
+    <dgm:constrLst>
+      <dgm:constr type="w" for="ch" forName="parentText" refType="w"/>
+      <dgm:constr type="h" for="ch" forName="parentText" refType="primFontSz" refFor="ch" refForName="parentText" fact="0.52"/>
+      <dgm:constr type="w" for="ch" forName="childText" refType="w"/>
+      <dgm:constr type="h" for="ch" forName="childText" refType="primFontSz" refFor="ch" refForName="parentText" fact="0.46"/>
+      <dgm:constr type="h" for="ch" forName="parentText" op="equ"/>
+      <dgm:constr type="primFontSz" for="ch" forName="parentText" op="equ" val="65"/>
+      <dgm:constr type="primFontSz" for="ch" forName="childText" refType="primFontSz" refFor="ch" refForName="parentText" op="equ"/>
+      <dgm:constr type="h" for="ch" forName="spacer" refType="primFontSz" refFor="ch" refForName="parentText" fact="0.08"/>
+    </dgm:constrLst>
+    <dgm:ruleLst>
+      <dgm:rule type="primFontSz" for="ch" forName="parentText" val="5" fact="NaN" max="NaN"/>
+    </dgm:ruleLst>
+    <dgm:forEach name="Name0" axis="ch" ptType="node">
+      <dgm:layoutNode name="parentText" styleLbl="node1">
+        <dgm:varLst>
+          <dgm:chMax val="0"/>
+          <dgm:bulletEnabled val="1"/>
+        </dgm:varLst>
+        <dgm:alg type="tx">
+          <dgm:param type="parTxLTRAlign" val="l"/>
+          <dgm:param type="parTxRTLAlign" val="r"/>
+        </dgm:alg>
+        <dgm:shape xmlns:r="http://schemas.openxmlformats.org/officeDocument/2006/relationships" type="roundRect" r:blip="">
+          <dgm:adjLst/>
+        </dgm:shape>
+        <dgm:presOf axis="self"/>
+        <dgm:constrLst>
+          <dgm:constr type="tMarg" refType="primFontSz" fact="0.3"/>
+          <dgm:constr type="bMarg" refType="primFontSz" fact="0.3"/>
+          <dgm:constr type="lMarg" refType="primFontSz" fact="0.3"/>
+          <dgm:constr type="rMarg" refType="primFontSz" fact="0.3"/>
+        </dgm:constrLst>
+        <dgm:ruleLst>
+          <dgm:rule type="h" val="INF" fact="NaN" max="NaN"/>
+        </dgm:ruleLst>
+      </dgm:layoutNode>
+      <dgm:choose name="Name1">
+        <dgm:if name="Name2" axis="ch" ptType="node" func="cnt" op="gte" val="1">
+          <dgm:layoutNode name="childText" styleLbl="revTx">
+            <dgm:varLst>
+              <dgm:bulletEnabled val="1"/>
+            </dgm:varLst>
+            <dgm:alg type="tx">
+              <dgm:param type="stBulletLvl" val="1"/>
+              <dgm:param type="lnSpAfChP" val="20"/>
+            </dgm:alg>
+            <dgm:shape xmlns:r="http://schemas.openxmlformats.org/officeDocument/2006/relationships" type="rect" r:blip="">
+              <dgm:adjLst/>
+            </dgm:shape>
+            <dgm:presOf axis="des" ptType="node"/>
+            <dgm:constrLst>
+              <dgm:constr type="tMarg" refType="primFontSz" fact="0.1"/>
+              <dgm:constr type="bMarg" refType="primFontSz" fact="0.1"/>
+              <dgm:constr type="lMarg" refType="w" fact="0.09"/>
+            </dgm:constrLst>
+            <dgm:ruleLst>
+              <dgm:rule type="h" val="INF" fact="NaN" max="NaN"/>
+            </dgm:ruleLst>
+          </dgm:layoutNode>
+        </dgm:if>
+        <dgm:else name="Name3">
+          <dgm:choose name="Name4">
+            <dgm:if name="Name5" axis="par ch" ptType="doc node" func="cnt" op="gte" val="2">
+              <dgm:forEach name="Name6" axis="followSib" ptType="sibTrans" cnt="1">
+                <dgm:layoutNode name="spacer">
+                  <dgm:alg type="sp"/>
+                  <dgm:shape xmlns:r="http://schemas.openxmlformats.org/officeDocument/2006/relationships" r:blip="">
+                    <dgm:adjLst/>
+                  </dgm:shape>
+                  <dgm:presOf/>
+                  <dgm:constrLst/>
+                  <dgm:ruleLst/>
+                </dgm:layoutNode>
+              </dgm:forEach>
+            </dgm:if>
+            <dgm:else name="Name7"/>
+          </dgm:choose>
+        </dgm:else>
+      </dgm:choose>
+    </dgm:forEach>
+  </dgm:layoutNode>
+</dgm:layoutDef>
+</file>
+
 <file path=ppt/diagrams/quickStyle1.xml><?xml version="1.0" encoding="utf-8"?>
+<dgm:styleDef xmlns:dgm="http://schemas.openxmlformats.org/drawingml/2006/diagram" xmlns:a="http://schemas.openxmlformats.org/drawingml/2006/main" uniqueId="urn:microsoft.com/office/officeart/2005/8/quickstyle/simple1">
+  <dgm:title val=""/>
+  <dgm:desc val=""/>
+  <dgm:catLst>
+    <dgm:cat type="simple" pri="10100"/>
+  </dgm:catLst>
+  <dgm:scene3d>
+    <a:camera prst="orthographicFront"/>
+    <a:lightRig rig="threePt" dir="t"/>
+  </dgm:scene3d>
+  <dgm:styleLbl name="node0">
+    <dgm:scene3d>
+      <a:camera prst="orthographicFront"/>
+      <a:lightRig rig="threePt" dir="t"/>
+    </dgm:scene3d>
+    <dgm:sp3d/>
+    <dgm:txPr/>
+    <dgm:style>
+      <a:lnRef idx="2">
+        <a:scrgbClr r="0" g="0" b="0"/>
+      </a:lnRef>
+      <a:fillRef idx="1">
+        <a:scrgbClr r="0" g="0" b="0"/>
+      </a:fillRef>
+      <a:effectRef idx="0">
+        <a:scrgbClr r="0" g="0" b="0"/>
+      </a:effectRef>
+      <a:fontRef idx="minor">
+        <a:schemeClr val="lt1"/>
+      </a:fontRef>
+    </dgm:style>
+  </dgm:styleLbl>
+  <dgm:styleLbl name="lnNode1">
+    <dgm:scene3d>
+      <a:camera prst="orthographicFront"/>
+      <a:lightRig rig="threePt" dir="t"/>
+    </dgm:scene3d>
+    <dgm:sp3d/>
+    <dgm:txPr/>
+    <dgm:style>
+      <a:lnRef idx="2">
+        <a:scrgbClr r="0" g="0" b="0"/>
+      </a:lnRef>
+      <a:fillRef idx="1">
+        <a:scrgbClr r="0" g="0" b="0"/>
+      </a:fillRef>
+      <a:effectRef idx="0">
+        <a:scrgbClr r="0" g="0" b="0"/>
+      </a:effectRef>
+      <a:fontRef idx="minor">
+        <a:schemeClr val="lt1"/>
+      </a:fontRef>
+    </dgm:style>
+  </dgm:styleLbl>
+  <dgm:styleLbl name="vennNode1">
+    <dgm:scene3d>
+      <a:camera prst="orthographicFront"/>
+      <a:lightRig rig="threePt" dir="t"/>
+    </dgm:scene3d>
+    <dgm:sp3d/>
+    <dgm:txPr/>
+    <dgm:style>
+      <a:lnRef idx="2">
+        <a:scrgbClr r="0" g="0" b="0"/>
+      </a:lnRef>
+      <a:fillRef idx="1">
+        <a:scrgbClr r="0" g="0" b="0"/>
+      </a:fillRef>
+      <a:effectRef idx="0">
+        <a:scrgbClr r="0" g="0" b="0"/>
+      </a:effectRef>
+      <a:fontRef idx="minor">
+        <a:schemeClr val="tx1"/>
+      </a:fontRef>
+    </dgm:style>
+  </dgm:styleLbl>
+  <dgm:styleLbl name="alignNode1">
+    <dgm:scene3d>
+      <a:camera prst="orthographicFront"/>
+      <a:lightRig rig="threePt" dir="t"/>
+    </dgm:scene3d>
+    <dgm:sp3d/>
+    <dgm:txPr/>
+    <dgm:style>
+      <a:lnRef idx="2">
+        <a:scrgbClr r="0" g="0" b="0"/>
+      </a:lnRef>
+      <a:fillRef idx="1">
+        <a:scrgbClr r="0" g="0" b="0"/>
+      </a:fillRef>
+      <a:effectRef idx="0">
+        <a:scrgbClr r="0" g="0" b="0"/>
+      </a:effectRef>
+      <a:fontRef idx="minor">
+        <a:schemeClr val="lt1"/>
+      </a:fontRef>
+    </dgm:style>
+  </dgm:styleLbl>
+  <dgm:styleLbl name="node1">
+    <dgm:scene3d>
+      <a:camera prst="orthographicFront"/>
+      <a:lightRig rig="threePt" dir="t"/>
+    </dgm:scene3d>
+    <dgm:sp3d/>
+    <dgm:txPr/>
+    <dgm:style>
+      <a:lnRef idx="2">
+        <a:scrgbClr r="0" g="0" b="0"/>
+      </a:lnRef>
+      <a:fillRef idx="1">
+        <a:scrgbClr r="0" g="0" b="0"/>
+      </a:fillRef>
+      <a:effectRef idx="0">
+        <a:scrgbClr r="0" g="0" b="0"/>
+      </a:effectRef>
+      <a:fontRef idx="minor">
+        <a:schemeClr val="lt1"/>
+      </a:fontRef>
+    </dgm:style>
+  </dgm:styleLbl>
+  <dgm:styleLbl name="node2">
+    <dgm:scene3d>
+      <a:camera prst="orthographicFront"/>
+      <a:lightRig rig="threePt" dir="t"/>
+    </dgm:scene3d>
+    <dgm:sp3d/>
+    <dgm:txPr/>
+    <dgm:style>
+      <a:lnRef idx="2">
+        <a:scrgbClr r="0" g="0" b="0"/>
+      </a:lnRef>
+      <a:fillRef idx="1">
+        <a:scrgbClr r="0" g="0" b="0"/>
+      </a:fillRef>
+      <a:effectRef idx="0">
+        <a:scrgbClr r="0" g="0" b="0"/>
+      </a:effectRef>
+      <a:fontRef idx="minor">
+        <a:schemeClr val="lt1"/>
+      </a:fontRef>
+    </dgm:style>
+  </dgm:styleLbl>
+  <dgm:styleLbl name="node3">
+    <dgm:scene3d>
+      <a:camera prst="orthographicFront"/>
+      <a:lightRig rig="threePt" dir="t"/>
+    </dgm:scene3d>
+    <dgm:sp3d/>
+    <dgm:txPr/>
+    <dgm:style>
+      <a:lnRef idx="2">
+        <a:scrgbClr r="0" g="0" b="0"/>
+      </a:lnRef>
+      <a:fillRef idx="1">
+        <a:scrgbClr r="0" g="0" b="0"/>
+      </a:fillRef>
+      <a:effectRef idx="0">
+        <a:scrgbClr r="0" g="0" b="0"/>
+      </a:effectRef>
+      <a:fontRef idx="minor">
+        <a:schemeClr val="lt1"/>
+      </a:fontRef>
+    </dgm:style>
+  </dgm:styleLbl>
+  <dgm:styleLbl name="node4">
+    <dgm:scene3d>
+      <a:camera prst="orthographicFront"/>
+      <a:lightRig rig="threePt" dir="t"/>
+    </dgm:scene3d>
+    <dgm:sp3d/>
+    <dgm:txPr/>
+    <dgm:style>
+      <a:lnRef idx="2">
+        <a:scrgbClr r="0" g="0" b="0"/>
+      </a:lnRef>
+      <a:fillRef idx="1">
+        <a:scrgbClr r="0" g="0" b="0"/>
+      </a:fillRef>
+      <a:effectRef idx="0">
+        <a:scrgbClr r="0" g="0" b="0"/>
+      </a:effectRef>
+      <a:fontRef idx="minor">
+        <a:schemeClr val="lt1"/>
+      </a:fontRef>
+    </dgm:style>
+  </dgm:styleLbl>
+  <dgm:styleLbl name="fgImgPlace1">
+    <dgm:scene3d>
+      <a:camera prst="orthographicFront"/>
+      <a:lightRig rig="threePt" dir="t"/>
+    </dgm:scene3d>
+    <dgm:sp3d/>
+    <dgm:txPr/>
+    <dgm:style>
+      <a:lnRef idx="2">
+        <a:scrgbClr r="0" g="0" b="0"/>
+      </a:lnRef>
+      <a:fillRef idx="1">
+        <a:scrgbClr r="0" g="0" b="0"/>
+      </a:fillRef>
+      <a:effectRef idx="0">
+        <a:scrgbClr r="0" g="0" b="0"/>
+      </a:effectRef>
+      <a:fontRef idx="minor"/>
+    </dgm:style>
+  </dgm:styleLbl>
+  <dgm:styleLbl name="alignImgPlace1">
+    <dgm:scene3d>
+      <a:camera prst="orthographicFront"/>
+      <a:lightRig rig="threePt" dir="t"/>
+    </dgm:scene3d>
+    <dgm:sp3d/>
+    <dgm:txPr/>
+    <dgm:style>
+      <a:lnRef idx="2">
+        <a:scrgbClr r="0" g="0" b="0"/>
+      </a:lnRef>
+      <a:fillRef idx="1">
+        <a:scrgbClr r="0" g="0" b="0"/>
+      </a:fillRef>
+      <a:effectRef idx="0">
+        <a:scrgbClr r="0" g="0" b="0"/>
+      </a:effectRef>
+      <a:fontRef idx="minor"/>
+    </dgm:style>
+  </dgm:styleLbl>
+  <dgm:styleLbl name="bgImgPlace1">
+    <dgm:scene3d>
+      <a:camera prst="orthographicFront"/>
+      <a:lightRig rig="threePt" dir="t"/>
+    </dgm:scene3d>
+    <dgm:sp3d/>
+    <dgm:txPr/>
+    <dgm:style>
+      <a:lnRef idx="2">
+        <a:scrgbClr r="0" g="0" b="0"/>
+      </a:lnRef>
+      <a:fillRef idx="1">
+        <a:scrgbClr r="0" g="0" b="0"/>
+      </a:fillRef>
+      <a:effectRef idx="0">
+        <a:scrgbClr r="0" g="0" b="0"/>
+      </a:effectRef>
+      <a:fontRef idx="minor"/>
+    </dgm:style>
+  </dgm:styleLbl>
+  <dgm:styleLbl name="sibTrans2D1">
+    <dgm:scene3d>
+      <a:camera prst="orthographicFront"/>
+      <a:lightRig rig="threePt" dir="t"/>
+    </dgm:scene3d>
+    <dgm:sp3d/>
+    <dgm:txPr/>
+    <dgm:style>
+      <a:lnRef idx="0">
+        <a:scrgbClr r="0" g="0" b="0"/>
+      </a:lnRef>
+      <a:fillRef idx="1">
+        <a:scrgbClr r="0" g="0" b="0"/>
+      </a:fillRef>
+      <a:effectRef idx="0">
+        <a:scrgbClr r="0" g="0" b="0"/>
+      </a:effectRef>
+      <a:fontRef idx="minor">
+        <a:schemeClr val="lt1"/>
+      </a:fontRef>
+    </dgm:style>
+  </dgm:styleLbl>
+  <dgm:styleLbl name="fgSibTrans2D1">
+    <dgm:scene3d>
+      <a:camera prst="orthographicFront"/>
+      <a:lightRig rig="threePt" dir="t"/>
+    </dgm:scene3d>
+    <dgm:sp3d/>
+    <dgm:txPr/>
+    <dgm:style>
+      <a:lnRef idx="0">
+        <a:scrgbClr r="0" g="0" b="0"/>
+      </a:lnRef>
+      <a:fillRef idx="1">
+        <a:scrgbClr r="0" g="0" b="0"/>
+      </a:fillRef>
+      <a:effectRef idx="0">
+        <a:scrgbClr r="0" g="0" b="0"/>
+      </a:effectRef>
+      <a:fontRef idx="minor">
+        <a:schemeClr val="lt1"/>
+      </a:fontRef>
+    </dgm:style>
+  </dgm:styleLbl>
+  <dgm:styleLbl name="bgSibTrans2D1">
+    <dgm:scene3d>
+      <a:camera prst="orthographicFront"/>
+      <a:lightRig rig="threePt" dir="t"/>
+    </dgm:scene3d>
+    <dgm:sp3d/>
+    <dgm:txPr/>
+    <dgm:style>
+      <a:lnRef idx="0">
+        <a:scrgbClr r="0" g="0" b="0"/>
+      </a:lnRef>
+      <a:fillRef idx="1">
+        <a:scrgbClr r="0" g="0" b="0"/>
+      </a:fillRef>
+      <a:effectRef idx="0">
+        <a:scrgbClr r="0" g="0" b="0"/>
+      </a:effectRef>
+      <a:fontRef idx="minor">
+        <a:schemeClr val="lt1"/>
+      </a:fontRef>
+    </dgm:style>
+  </dgm:styleLbl>
+  <dgm:styleLbl name="sibTrans1D1">
+    <dgm:scene3d>
+      <a:camera prst="orthographicFront"/>
+      <a:lightRig rig="threePt" dir="t"/>
+    </dgm:scene3d>
+    <dgm:sp3d/>
+    <dgm:txPr/>
+    <dgm:style>
+      <a:lnRef idx="1">
+        <a:scrgbClr r="0" g="0" b="0"/>
+      </a:lnRef>
+      <a:fillRef idx="0">
+        <a:scrgbClr r="0" g="0" b="0"/>
+      </a:fillRef>
+      <a:effectRef idx="0">
+        <a:scrgbClr r="0" g="0" b="0"/>
+      </a:effectRef>
+      <a:fontRef idx="minor"/>
+    </dgm:style>
+  </dgm:styleLbl>
+  <dgm:styleLbl name="callout">
+    <dgm:scene3d>
+      <a:camera prst="orthographicFront"/>
+      <a:lightRig rig="threePt" dir="t"/>
+    </dgm:scene3d>
+    <dgm:sp3d/>
+    <dgm:txPr/>
+    <dgm:style>
+      <a:lnRef idx="2">
+        <a:scrgbClr r="0" g="0" b="0"/>
+      </a:lnRef>
+      <a:fillRef idx="1">
+        <a:scrgbClr r="0" g="0" b="0"/>
+      </a:fillRef>
+      <a:effectRef idx="0">
+        <a:scrgbClr r="0" g="0" b="0"/>
+      </a:effectRef>
+      <a:fontRef idx="minor"/>
+    </dgm:style>
+  </dgm:styleLbl>
+  <dgm:styleLbl name="asst0">
+    <dgm:scene3d>
+      <a:camera prst="orthographicFront"/>
+      <a:lightRig rig="threePt" dir="t"/>
+    </dgm:scene3d>
+    <dgm:sp3d/>
+    <dgm:txPr/>
+    <dgm:style>
+      <a:lnRef idx="2">
+        <a:scrgbClr r="0" g="0" b="0"/>
+      </a:lnRef>
+      <a:fillRef idx="1">
+        <a:scrgbClr r="0" g="0" b="0"/>
+      </a:fillRef>
+      <a:effectRef idx="0">
+        <a:scrgbClr r="0" g="0" b="0"/>
+      </a:effectRef>
+      <a:fontRef idx="minor">
+        <a:schemeClr val="lt1"/>
+      </a:fontRef>
+    </dgm:style>
+  </dgm:styleLbl>
+  <dgm:styleLbl name="asst1">
+    <dgm:scene3d>
+      <a:camera prst="orthographicFront"/>
+      <a:lightRig rig="threePt" dir="t"/>
+    </dgm:scene3d>
+    <dgm:sp3d/>
+    <dgm:txPr/>
+    <dgm:style>
+      <a:lnRef idx="2">
+        <a:scrgbClr r="0" g="0" b="0"/>
+      </a:lnRef>
+      <a:fillRef idx="1">
+        <a:scrgbClr r="0" g="0" b="0"/>
+      </a:fillRef>
+      <a:effectRef idx="0">
+        <a:scrgbClr r="0" g="0" b="0"/>
+      </a:effectRef>
+      <a:fontRef idx="minor">
+        <a:schemeClr val="lt1"/>
+      </a:fontRef>
+    </dgm:style>
+  </dgm:styleLbl>
+  <dgm:styleLbl name="asst2">
+    <dgm:scene3d>
+      <a:camera prst="orthographicFront"/>
+      <a:lightRig rig="threePt" dir="t"/>
+    </dgm:scene3d>
+    <dgm:sp3d/>
+    <dgm:txPr/>
+    <dgm:style>
+      <a:lnRef idx="2">
+        <a:scrgbClr r="0" g="0" b="0"/>
+      </a:lnRef>
+      <a:fillRef idx="1">
+        <a:scrgbClr r="0" g="0" b="0"/>
+      </a:fillRef>
+      <a:effectRef idx="0">
+        <a:scrgbClr r="0" g="0" b="0"/>
+      </a:effectRef>
+      <a:fontRef idx="minor">
+        <a:schemeClr val="lt1"/>
+      </a:fontRef>
+    </dgm:style>
+  </dgm:styleLbl>
+  <dgm:styleLbl name="asst3">
+    <dgm:scene3d>
+      <a:camera prst="orthographicFront"/>
+      <a:lightRig rig="threePt" dir="t"/>
+    </dgm:scene3d>
+    <dgm:sp3d/>
+    <dgm:txPr/>
+    <dgm:style>
+      <a:lnRef idx="2">
+        <a:scrgbClr r="0" g="0" b="0"/>
+      </a:lnRef>
+      <a:fillRef idx="1">
+        <a:scrgbClr r="0" g="0" b="0"/>
+      </a:fillRef>
+      <a:effectRef idx="0">
+        <a:scrgbClr r="0" g="0" b="0"/>
+      </a:effectRef>
+      <a:fontRef idx="minor">
+        <a:schemeClr val="lt1"/>
+      </a:fontRef>
+    </dgm:style>
+  </dgm:styleLbl>
+  <dgm:styleLbl name="asst4">
+    <dgm:scene3d>
+      <a:camera prst="orthographicFront"/>
+      <a:lightRig rig="threePt" dir="t"/>
+    </dgm:scene3d>
+    <dgm:sp3d/>
+    <dgm:txPr/>
+    <dgm:style>
+      <a:lnRef idx="2">
+        <a:scrgbClr r="0" g="0" b="0"/>
+      </a:lnRef>
+      <a:fillRef idx="1">
+        <a:scrgbClr r="0" g="0" b="0"/>
+      </a:fillRef>
+      <a:effectRef idx="0">
+        <a:scrgbClr r="0" g="0" b="0"/>
+      </a:effectRef>
+      <a:fontRef idx="minor">
+        <a:schemeClr val="lt1"/>
+      </a:fontRef>
+    </dgm:style>
+  </dgm:styleLbl>
+  <dgm:styleLbl name="parChTrans2D1">
+    <dgm:scene3d>
+      <a:camera prst="orthographicFront"/>
+      <a:lightRig rig="threePt" dir="t"/>
+    </dgm:scene3d>
+    <dgm:sp3d/>
+    <dgm:txPr/>
+    <dgm:style>
+      <a:lnRef idx="2">
+        <a:scrgbClr r="0" g="0" b="0"/>
+      </a:lnRef>
+      <a:fillRef idx="1">
+        <a:scrgbClr r="0" g="0" b="0"/>
+      </a:fillRef>
+      <a:effectRef idx="0">
+        <a:scrgbClr r="0" g="0" b="0"/>
+      </a:effectRef>
+      <a:fontRef idx="minor">
+        <a:schemeClr val="lt1"/>
+      </a:fontRef>
+    </dgm:style>
+  </dgm:styleLbl>
+  <dgm:styleLbl name="parChTrans2D2">
+    <dgm:scene3d>
+      <a:camera prst="orthographicFront"/>
+      <a:lightRig rig="threePt" dir="t"/>
+    </dgm:scene3d>
+    <dgm:sp3d/>
+    <dgm:txPr/>
+    <dgm:style>
+      <a:lnRef idx="2">
+        <a:scrgbClr r="0" g="0" b="0"/>
+      </a:lnRef>
+      <a:fillRef idx="1">
+        <a:scrgbClr r="0" g="0" b="0"/>
+      </a:fillRef>
+      <a:effectRef idx="0">
+        <a:scrgbClr r="0" g="0" b="0"/>
+      </a:effectRef>
+      <a:fontRef idx="minor">
+        <a:schemeClr val="lt1"/>
+      </a:fontRef>
+    </dgm:style>
+  </dgm:styleLbl>
+  <dgm:styleLbl name="parChTrans2D3">
+    <dgm:scene3d>
+      <a:camera prst="orthographicFront"/>
+      <a:lightRig rig="threePt" dir="t"/>
+    </dgm:scene3d>
+    <dgm:sp3d/>
+    <dgm:txPr/>
+    <dgm:style>
+      <a:lnRef idx="2">
+        <a:scrgbClr r="0" g="0" b="0"/>
+      </a:lnRef>
+      <a:fillRef idx="1">
+        <a:scrgbClr r="0" g="0" b="0"/>
+      </a:fillRef>
+      <a:effectRef idx="0">
+        <a:scrgbClr r="0" g="0" b="0"/>
+      </a:effectRef>
+      <a:fontRef idx="minor">
+        <a:schemeClr val="lt1"/>
+      </a:fontRef>
+    </dgm:style>
+  </dgm:styleLbl>
+  <dgm:styleLbl name="parChTrans2D4">
+    <dgm:scene3d>
+      <a:camera prst="orthographicFront"/>
+      <a:lightRig rig="threePt" dir="t"/>
+    </dgm:scene3d>
+    <dgm:sp3d/>
+    <dgm:txPr/>
+    <dgm:style>
+      <a:lnRef idx="2">
+        <a:scrgbClr r="0" g="0" b="0"/>
+      </a:lnRef>
+      <a:fillRef idx="1">
+        <a:scrgbClr r="0" g="0" b="0"/>
+      </a:fillRef>
+      <a:effectRef idx="0">
+        <a:scrgbClr r="0" g="0" b="0"/>
+      </a:effectRef>
+      <a:fontRef idx="minor">
+        <a:schemeClr val="lt1"/>
+      </a:fontRef>
+    </dgm:style>
+  </dgm:styleLbl>
+  <dgm:styleLbl name="parChTrans1D1">
+    <dgm:scene3d>
+      <a:camera prst="orthographicFront"/>
+      <a:lightRig rig="threePt" dir="t"/>
+    </dgm:scene3d>
+    <dgm:sp3d/>
+    <dgm:txPr/>
+    <dgm:style>
+      <a:lnRef idx="2">
+        <a:scrgbClr r="0" g="0" b="0"/>
+      </a:lnRef>
+      <a:fillRef idx="0">
+        <a:scrgbClr r="0" g="0" b="0"/>
+      </a:fillRef>
+      <a:effectRef idx="0">
+        <a:scrgbClr r="0" g="0" b="0"/>
+      </a:effectRef>
+      <a:fontRef idx="minor"/>
+    </dgm:style>
+  </dgm:styleLbl>
+  <dgm:styleLbl name="parChTrans1D2">
+    <dgm:scene3d>
+      <a:camera prst="orthographicFront"/>
+      <a:lightRig rig="threePt" dir="t"/>
+    </dgm:scene3d>
+    <dgm:sp3d/>
+    <dgm:txPr/>
+    <dgm:style>
+      <a:lnRef idx="2">
+        <a:scrgbClr r="0" g="0" b="0"/>
+      </a:lnRef>
+      <a:fillRef idx="0">
+        <a:scrgbClr r="0" g="0" b="0"/>
+      </a:fillRef>
+      <a:effectRef idx="0">
+        <a:scrgbClr r="0" g="0" b="0"/>
+      </a:effectRef>
+      <a:fontRef idx="minor"/>
+    </dgm:style>
+  </dgm:styleLbl>
+  <dgm:styleLbl name="parChTrans1D3">
+    <dgm:scene3d>
+      <a:camera prst="orthographicFront"/>
+      <a:lightRig rig="threePt" dir="t"/>
+    </dgm:scene3d>
+    <dgm:sp3d/>
+    <dgm:txPr/>
+    <dgm:style>
+      <a:lnRef idx="2">
+        <a:scrgbClr r="0" g="0" b="0"/>
+      </a:lnRef>
+      <a:fillRef idx="0">
+        <a:scrgbClr r="0" g="0" b="0"/>
+      </a:fillRef>
+      <a:effectRef idx="0">
+        <a:scrgbClr r="0" g="0" b="0"/>
+      </a:effectRef>
+      <a:fontRef idx="minor"/>
+    </dgm:style>
+  </dgm:styleLbl>
+  <dgm:styleLbl name="parChTrans1D4">
+    <dgm:scene3d>
+      <a:camera prst="orthographicFront"/>
+      <a:lightRig rig="threePt" dir="t"/>
+    </dgm:scene3d>
+    <dgm:sp3d/>
+    <dgm:txPr/>
+    <dgm:style>
+      <a:lnRef idx="2">
+        <a:scrgbClr r="0" g="0" b="0"/>
+      </a:lnRef>
+      <a:fillRef idx="0">
+        <a:scrgbClr r="0" g="0" b="0"/>
+      </a:fillRef>
+      <a:effectRef idx="0">
+        <a:scrgbClr r="0" g="0" b="0"/>
+      </a:effectRef>
+      <a:fontRef idx="minor"/>
+    </dgm:style>
+  </dgm:styleLbl>
+  <dgm:styleLbl name="fgAcc1">
+    <dgm:scene3d>
+      <a:camera prst="orthographicFront"/>
+      <a:lightRig rig="threePt" dir="t"/>
+    </dgm:scene3d>
+    <dgm:sp3d/>
+    <dgm:txPr/>
+    <dgm:style>
+      <a:lnRef idx="2">
+        <a:scrgbClr r="0" g="0" b="0"/>
+      </a:lnRef>
+      <a:fillRef idx="1">
+        <a:scrgbClr r="0" g="0" b="0"/>
+      </a:fillRef>
+      <a:effectRef idx="0">
+        <a:scrgbClr r="0" g="0" b="0"/>
+      </a:effectRef>
+      <a:fontRef idx="minor"/>
+    </dgm:style>
+  </dgm:styleLbl>
+  <dgm:styleLbl name="conFgAcc1">
+    <dgm:scene3d>
+      <a:camera prst="orthographicFront"/>
+      <a:lightRig rig="threePt" dir="t"/>
+    </dgm:scene3d>
+    <dgm:sp3d/>
+    <dgm:txPr/>
+    <dgm:style>
+      <a:lnRef idx="2">
+        <a:scrgbClr r="0" g="0" b="0"/>
+      </a:lnRef>
+      <a:fillRef idx="1">
+        <a:scrgbClr r="0" g="0" b="0"/>
+      </a:fillRef>
+      <a:effectRef idx="0">
+        <a:scrgbClr r="0" g="0" b="0"/>
+      </a:effectRef>
+      <a:fontRef idx="minor"/>
+    </dgm:style>
+  </dgm:styleLbl>
+  <dgm:styleLbl name="alignAcc1">
+    <dgm:scene3d>
+      <a:camera prst="orthographicFront"/>
+      <a:lightRig rig="threePt" dir="t"/>
+    </dgm:scene3d>
+    <dgm:sp3d/>
+    <dgm:txPr/>
+    <dgm:style>
+      <a:lnRef idx="2">
+        <a:scrgbClr r="0" g="0" b="0"/>
+      </a:lnRef>
+      <a:fillRef idx="1">
+        <a:scrgbClr r="0" g="0" b="0"/>
+      </a:fillRef>
+      <a:effectRef idx="0">
+        <a:scrgbClr r="0" g="0" b="0"/>
+      </a:effectRef>
+      <a:fontRef idx="minor"/>
+    </dgm:style>
+  </dgm:styleLbl>
+  <dgm:styleLbl name="trAlignAcc1">
+    <dgm:scene3d>
+      <a:camera prst="orthographicFront"/>
+      <a:lightRig rig="threePt" dir="t"/>
+    </dgm:scene3d>
+    <dgm:sp3d/>
+    <dgm:txPr/>
+    <dgm:style>
+      <a:lnRef idx="1">
+        <a:scrgbClr r="0" g="0" b="0"/>
+      </a:lnRef>
+      <a:fillRef idx="1">
+        <a:scrgbClr r="0" g="0" b="0"/>
+      </a:fillRef>
+      <a:effectRef idx="0">
+        <a:scrgbClr r="0" g="0" b="0"/>
+      </a:effectRef>
+      <a:fontRef idx="minor"/>
+    </dgm:style>
+  </dgm:styleLbl>
+  <dgm:styleLbl name="bgAcc1">
+    <dgm:scene3d>
+      <a:camera prst="orthographicFront"/>
+      <a:lightRig rig="threePt" dir="t"/>
+    </dgm:scene3d>
+    <dgm:sp3d/>
+    <dgm:txPr/>
+    <dgm:style>
+      <a:lnRef idx="2">
+        <a:scrgbClr r="0" g="0" b="0"/>
+      </a:lnRef>
+      <a:fillRef idx="1">
+        <a:scrgbClr r="0" g="0" b="0"/>
+      </a:fillRef>
+      <a:effectRef idx="0">
+        <a:scrgbClr r="0" g="0" b="0"/>
+      </a:effectRef>
+      <a:fontRef idx="minor"/>
+    </dgm:style>
+  </dgm:styleLbl>
+  <dgm:styleLbl name="solidFgAcc1">
+    <dgm:scene3d>
+      <a:camera prst="orthographicFront"/>
+      <a:lightRig rig="threePt" dir="t"/>
+    </dgm:scene3d>
+    <dgm:sp3d/>
+    <dgm:txPr/>
+    <dgm:style>
+      <a:lnRef idx="2">
+        <a:scrgbClr r="0" g="0" b="0"/>
+      </a:lnRef>
+      <a:fillRef idx="1">
+        <a:scrgbClr r="0" g="0" b="0"/>
+      </a:fillRef>
+      <a:effectRef idx="0">
+        <a:scrgbClr r="0" g="0" b="0"/>
+      </a:effectRef>
+      <a:fontRef idx="minor"/>
+    </dgm:style>
+  </dgm:styleLbl>
+  <dgm:styleLbl name="solidAlignAcc1">
+    <dgm:scene3d>
+      <a:camera prst="orthographicFront"/>
+      <a:lightRig rig="threePt" dir="t"/>
+    </dgm:scene3d>
+    <dgm:sp3d/>
+    <dgm:txPr/>
+    <dgm:style>
+      <a:lnRef idx="2">
+        <a:scrgbClr r="0" g="0" b="0"/>
+      </a:lnRef>
+      <a:fillRef idx="1">
+        <a:scrgbClr r="0" g="0" b="0"/>
+      </a:fillRef>
+      <a:effectRef idx="0">
+        <a:scrgbClr r="0" g="0" b="0"/>
+      </a:effectRef>
+      <a:fontRef idx="minor"/>
+    </dgm:style>
+  </dgm:styleLbl>
+  <dgm:styleLbl name="solidBgAcc1">
+    <dgm:scene3d>
+      <a:camera prst="orthographicFront"/>
+      <a:lightRig rig="threePt" dir="t"/>
+    </dgm:scene3d>
+    <dgm:sp3d/>
+    <dgm:txPr/>
+    <dgm:style>
+      <a:lnRef idx="2">
+        <a:scrgbClr r="0" g="0" b="0"/>
+      </a:lnRef>
+      <a:fillRef idx="1">
+        <a:scrgbClr r="0" g="0" b="0"/>
+      </a:fillRef>
+      <a:effectRef idx="0">
+        <a:scrgbClr r="0" g="0" b="0"/>
+      </a:effectRef>
+      <a:fontRef idx="minor"/>
+    </dgm:style>
+  </dgm:styleLbl>
+  <dgm:styleLbl name="fgAccFollowNode1">
+    <dgm:scene3d>
+      <a:camera prst="orthographicFront"/>
+      <a:lightRig rig="threePt" dir="t"/>
+    </dgm:scene3d>
+    <dgm:sp3d/>
+    <dgm:txPr/>
+    <dgm:style>
+      <a:lnRef idx="2">
+        <a:scrgbClr r="0" g="0" b="0"/>
+      </a:lnRef>
+      <a:fillRef idx="1">
+        <a:scrgbClr r="0" g="0" b="0"/>
+      </a:fillRef>
+      <a:effectRef idx="0">
+        <a:scrgbClr r="0" g="0" b="0"/>
+      </a:effectRef>
+      <a:fontRef idx="minor"/>
+    </dgm:style>
+  </dgm:styleLbl>
+  <dgm:styleLbl name="alignAccFollowNode1">
+    <dgm:scene3d>
+      <a:camera prst="orthographicFront"/>
+      <a:lightRig rig="threePt" dir="t"/>
+    </dgm:scene3d>
+    <dgm:sp3d/>
+    <dgm:txPr/>
+    <dgm:style>
+      <a:lnRef idx="2">
+        <a:scrgbClr r="0" g="0" b="0"/>
+      </a:lnRef>
+      <a:fillRef idx="1">
+        <a:scrgbClr r="0" g="0" b="0"/>
+      </a:fillRef>
+      <a:effectRef idx="0">
+        <a:scrgbClr r="0" g="0" b="0"/>
+      </a:effectRef>
+      <a:fontRef idx="minor"/>
+    </dgm:style>
+  </dgm:styleLbl>
+  <dgm:styleLbl name="bgAccFollowNode1">
+    <dgm:scene3d>
+      <a:camera prst="orthographicFront"/>
+      <a:lightRig rig="threePt" dir="t"/>
+    </dgm:scene3d>
+    <dgm:sp3d/>
+    <dgm:txPr/>
+    <dgm:style>
+      <a:lnRef idx="2">
+        <a:scrgbClr r="0" g="0" b="0"/>
+      </a:lnRef>
+      <a:fillRef idx="1">
+        <a:scrgbClr r="0" g="0" b="0"/>
+      </a:fillRef>
+      <a:effectRef idx="0">
+        <a:scrgbClr r="0" g="0" b="0"/>
+      </a:effectRef>
+      <a:fontRef idx="minor"/>
+    </dgm:style>
+  </dgm:styleLbl>
+  <dgm:styleLbl name="fgAcc0">
+    <dgm:scene3d>
+      <a:camera prst="orthographicFront"/>
+      <a:lightRig rig="threePt" dir="t"/>
+    </dgm:scene3d>
+    <dgm:sp3d/>
+    <dgm:txPr/>
+    <dgm:style>
+      <a:lnRef idx="2">
+        <a:scrgbClr r="0" g="0" b="0"/>
+      </a:lnRef>
+      <a:fillRef idx="1">
+        <a:scrgbClr r="0" g="0" b="0"/>
+      </a:fillRef>
+      <a:effectRef idx="0">
+        <a:scrgbClr r="0" g="0" b="0"/>
+      </a:effectRef>
+      <a:fontRef idx="minor"/>
+    </dgm:style>
+  </dgm:styleLbl>
+  <dgm:styleLbl name="fgAcc2">
+    <dgm:scene3d>
+      <a:camera prst="orthographicFront"/>
+      <a:lightRig rig="threePt" dir="t"/>
+    </dgm:scene3d>
+    <dgm:sp3d/>
+    <dgm:txPr/>
+    <dgm:style>
+      <a:lnRef idx="2">
+        <a:scrgbClr r="0" g="0" b="0"/>
+      </a:lnRef>
+      <a:fillRef idx="1">
+        <a:scrgbClr r="0" g="0" b="0"/>
+      </a:fillRef>
+      <a:effectRef idx="0">
+        <a:scrgbClr r="0" g="0" b="0"/>
+      </a:effectRef>
+      <a:fontRef idx="minor"/>
+    </dgm:style>
+  </dgm:styleLbl>
+  <dgm:styleLbl name="fgAcc3">
+    <dgm:scene3d>
+      <a:camera prst="orthographicFront"/>
+      <a:lightRig rig="threePt" dir="t"/>
+    </dgm:scene3d>
+    <dgm:sp3d/>
+    <dgm:txPr/>
+    <dgm:style>
+      <a:lnRef idx="2">
+        <a:scrgbClr r="0" g="0" b="0"/>
+      </a:lnRef>
+      <a:fillRef idx="1">
+        <a:scrgbClr r="0" g="0" b="0"/>
+      </a:fillRef>
+      <a:effectRef idx="0">
+        <a:scrgbClr r="0" g="0" b="0"/>
+      </a:effectRef>
+      <a:fontRef idx="minor"/>
+    </dgm:style>
+  </dgm:styleLbl>
+  <dgm:styleLbl name="fgAcc4">
+    <dgm:scene3d>
+      <a:camera prst="orthographicFront"/>
+      <a:lightRig rig="threePt" dir="t"/>
+    </dgm:scene3d>
+    <dgm:sp3d/>
+    <dgm:txPr/>
+    <dgm:style>
+      <a:lnRef idx="2">
+        <a:scrgbClr r="0" g="0" b="0"/>
+      </a:lnRef>
+      <a:fillRef idx="1">
+        <a:scrgbClr r="0" g="0" b="0"/>
+      </a:fillRef>
+      <a:effectRef idx="0">
+        <a:scrgbClr r="0" g="0" b="0"/>
+      </a:effectRef>
+      <a:fontRef idx="minor"/>
+    </dgm:style>
+  </dgm:styleLbl>
+  <dgm:styleLbl name="bgShp">
+    <dgm:scene3d>
+      <a:camera prst="orthographicFront"/>
+      <a:lightRig rig="threePt" dir="t"/>
+    </dgm:scene3d>
+    <dgm:sp3d/>
+    <dgm:txPr/>
+    <dgm:style>
+      <a:lnRef idx="0">
+        <a:scrgbClr r="0" g="0" b="0"/>
+      </a:lnRef>
+      <a:fillRef idx="1">
+        <a:scrgbClr r="0" g="0" b="0"/>
+      </a:fillRef>
+      <a:effectRef idx="0">
+        <a:scrgbClr r="0" g="0" b="0"/>
+      </a:effectRef>
+      <a:fontRef idx="minor"/>
+    </dgm:style>
+  </dgm:styleLbl>
+  <dgm:styleLbl name="dkBgShp">
+    <dgm:scene3d>
+      <a:camera prst="orthographicFront"/>
+      <a:lightRig rig="threePt" dir="t"/>
+    </dgm:scene3d>
+    <dgm:sp3d/>
+    <dgm:txPr/>
+    <dgm:style>
+      <a:lnRef idx="0">
+        <a:scrgbClr r="0" g="0" b="0"/>
+      </a:lnRef>
+      <a:fillRef idx="1">
+        <a:scrgbClr r="0" g="0" b="0"/>
+      </a:fillRef>
+      <a:effectRef idx="0">
+        <a:scrgbClr r="0" g="0" b="0"/>
+      </a:effectRef>
+      <a:fontRef idx="minor"/>
+    </dgm:style>
+  </dgm:styleLbl>
+  <dgm:styleLbl name="trBgShp">
+    <dgm:scene3d>
+      <a:camera prst="orthographicFront"/>
+      <a:lightRig rig="threePt" dir="t"/>
+    </dgm:scene3d>
+    <dgm:sp3d/>
+    <dgm:txPr/>
+    <dgm:style>
+      <a:lnRef idx="0">
+        <a:scrgbClr r="0" g="0" b="0"/>
+      </a:lnRef>
+      <a:fillRef idx="1">
+        <a:scrgbClr r="0" g="0" b="0"/>
+      </a:fillRef>
+      <a:effectRef idx="0">
+        <a:scrgbClr r="0" g="0" b="0"/>
+      </a:effectRef>
+      <a:fontRef idx="minor"/>
+    </dgm:style>
+  </dgm:styleLbl>
+  <dgm:styleLbl name="fgShp">
+    <dgm:scene3d>
+      <a:camera prst="orthographicFront"/>
+      <a:lightRig rig="threePt" dir="t"/>
+    </dgm:scene3d>
+    <dgm:sp3d/>
+    <dgm:txPr/>
+    <dgm:style>
+      <a:lnRef idx="2">
+        <a:scrgbClr r="0" g="0" b="0"/>
+      </a:lnRef>
+      <a:fillRef idx="1">
+        <a:scrgbClr r="0" g="0" b="0"/>
+      </a:fillRef>
+      <a:effectRef idx="0">
+        <a:scrgbClr r="0" g="0" b="0"/>
+      </a:effectRef>
+      <a:fontRef idx="minor"/>
+    </dgm:style>
+  </dgm:styleLbl>
+  <dgm:styleLbl name="revTx">
+    <dgm:scene3d>
+      <a:camera prst="orthographicFront"/>
+      <a:lightRig rig="threePt" dir="t"/>
+    </dgm:scene3d>
+    <dgm:sp3d/>
+    <dgm:txPr/>
+    <dgm:style>
+      <a:lnRef idx="0">
+        <a:scrgbClr r="0" g="0" b="0"/>
+      </a:lnRef>
+      <a:fillRef idx="0">
+        <a:scrgbClr r="0" g="0" b="0"/>
+      </a:fillRef>
+      <a:effectRef idx="0">
+        <a:scrgbClr r="0" g="0" b="0"/>
+      </a:effectRef>
+      <a:fontRef idx="minor"/>
+    </dgm:style>
+  </dgm:styleLbl>
+</dgm:styleDef>
+</file>
+
+<file path=ppt/diagrams/quickStyle2.xml><?xml version="1.0" encoding="utf-8"?>
 <dgm:styleDef xmlns:dgm="http://schemas.openxmlformats.org/drawingml/2006/diagram" xmlns:a="http://schemas.openxmlformats.org/drawingml/2006/main" uniqueId="urn:microsoft.com/office/officeart/2005/8/quickstyle/simple1">
   <dgm:title val=""/>
   <dgm:desc val=""/>
@@ -4020,7 +6795,7 @@
           <a:p>
             <a:fld id="{8DEA2CF1-0EB2-4673-802D-3371233E4A77}" type="datetime2">
               <a:rPr lang="en-US" smtClean="0"/>
-              <a:t>Friday, April 22, 2022</a:t>
+              <a:t>Tuesday, January 16, 2024</a:t>
             </a:fld>
             <a:endParaRPr lang="en-US" dirty="0"/>
           </a:p>
@@ -4235,7 +7010,7 @@
           <a:p>
             <a:fld id="{8DEA2CF1-0EB2-4673-802D-3371233E4A77}" type="datetime2">
               <a:rPr lang="en-US" smtClean="0"/>
-              <a:t>Friday, April 22, 2022</a:t>
+              <a:t>Tuesday, January 16, 2024</a:t>
             </a:fld>
             <a:endParaRPr lang="en-US" dirty="0"/>
           </a:p>
@@ -4498,7 +7273,7 @@
           <a:p>
             <a:fld id="{8DEA2CF1-0EB2-4673-802D-3371233E4A77}" type="datetime2">
               <a:rPr lang="en-US" smtClean="0"/>
-              <a:t>Friday, April 22, 2022</a:t>
+              <a:t>Tuesday, January 16, 2024</a:t>
             </a:fld>
             <a:endParaRPr lang="en-US" dirty="0"/>
           </a:p>
@@ -4679,7 +7454,7 @@
           <a:p>
             <a:fld id="{8DEA2CF1-0EB2-4673-802D-3371233E4A77}" type="datetime2">
               <a:rPr lang="en-US" smtClean="0"/>
-              <a:t>Friday, April 22, 2022</a:t>
+              <a:t>Tuesday, January 16, 2024</a:t>
             </a:fld>
             <a:endParaRPr lang="en-US" dirty="0"/>
           </a:p>
@@ -5029,7 +7804,7 @@
           <a:p>
             <a:fld id="{8DEA2CF1-0EB2-4673-802D-3371233E4A77}" type="datetime2">
               <a:rPr lang="en-US" smtClean="0"/>
-              <a:t>Friday, April 22, 2022</a:t>
+              <a:t>Tuesday, January 16, 2024</a:t>
             </a:fld>
             <a:endParaRPr lang="en-US" dirty="0"/>
           </a:p>
@@ -5311,7 +8086,7 @@
           <a:p>
             <a:fld id="{8DEA2CF1-0EB2-4673-802D-3371233E4A77}" type="datetime2">
               <a:rPr lang="en-US" smtClean="0"/>
-              <a:t>Friday, April 22, 2022</a:t>
+              <a:t>Tuesday, January 16, 2024</a:t>
             </a:fld>
             <a:endParaRPr lang="en-US" dirty="0"/>
           </a:p>
@@ -5697,7 +8472,7 @@
           <a:p>
             <a:fld id="{8DEA2CF1-0EB2-4673-802D-3371233E4A77}" type="datetime2">
               <a:rPr lang="en-US" smtClean="0"/>
-              <a:t>Friday, April 22, 2022</a:t>
+              <a:t>Tuesday, January 16, 2024</a:t>
             </a:fld>
             <a:endParaRPr lang="en-US" dirty="0"/>
           </a:p>
@@ -5822,7 +8597,7 @@
           <a:p>
             <a:fld id="{8DEA2CF1-0EB2-4673-802D-3371233E4A77}" type="datetime2">
               <a:rPr lang="en-US" smtClean="0"/>
-              <a:t>Friday, April 22, 2022</a:t>
+              <a:t>Tuesday, January 16, 2024</a:t>
             </a:fld>
             <a:endParaRPr lang="en-US" dirty="0"/>
           </a:p>
@@ -6000,7 +8775,7 @@
           <a:p>
             <a:fld id="{8DEA2CF1-0EB2-4673-802D-3371233E4A77}" type="datetime2">
               <a:rPr lang="en-US" smtClean="0"/>
-              <a:t>Friday, April 22, 2022</a:t>
+              <a:t>Tuesday, January 16, 2024</a:t>
             </a:fld>
             <a:endParaRPr lang="en-US" dirty="0"/>
           </a:p>
@@ -6361,7 +9136,7 @@
           <a:p>
             <a:fld id="{8DEA2CF1-0EB2-4673-802D-3371233E4A77}" type="datetime2">
               <a:rPr lang="en-US" smtClean="0"/>
-              <a:t>Friday, April 22, 2022</a:t>
+              <a:t>Tuesday, January 16, 2024</a:t>
             </a:fld>
             <a:endParaRPr lang="en-US" dirty="0"/>
           </a:p>
@@ -6750,7 +9525,7 @@
           <a:p>
             <a:fld id="{8DEA2CF1-0EB2-4673-802D-3371233E4A77}" type="datetime2">
               <a:rPr lang="en-US" smtClean="0"/>
-              <a:t>Friday, April 22, 2022</a:t>
+              <a:t>Tuesday, January 16, 2024</a:t>
             </a:fld>
             <a:endParaRPr lang="en-US" dirty="0"/>
           </a:p>
@@ -7044,7 +9819,7 @@
           <a:p>
             <a:fld id="{8DEA2CF1-0EB2-4673-802D-3371233E4A77}" type="datetime2">
               <a:rPr lang="en-US" smtClean="0"/>
-              <a:t>Friday, April 22, 2022</a:t>
+              <a:t>Tuesday, January 16, 2024</a:t>
             </a:fld>
             <a:endParaRPr lang="en-US" dirty="0"/>
           </a:p>
@@ -7913,6 +10688,13 @@
             <a:schemeClr val="lt1"/>
           </a:fontRef>
         </p:style>
+        <p:txBody>
+          <a:bodyPr/>
+          <a:lstStyle/>
+          <a:p>
+            <a:endParaRPr lang="zh-CN" altLang="en-US"/>
+          </a:p>
+        </p:txBody>
       </p:sp>
       <p:sp>
         <p:nvSpPr>
@@ -7968,6 +10750,13 @@
             <a:schemeClr val="lt1"/>
           </a:fontRef>
         </p:style>
+        <p:txBody>
+          <a:bodyPr/>
+          <a:lstStyle/>
+          <a:p>
+            <a:endParaRPr lang="zh-CN" altLang="en-US"/>
+          </a:p>
+        </p:txBody>
       </p:sp>
       <p:sp>
         <p:nvSpPr>
@@ -8822,6 +11611,13 @@
             <a:schemeClr val="lt1"/>
           </a:fontRef>
         </p:style>
+        <p:txBody>
+          <a:bodyPr/>
+          <a:lstStyle/>
+          <a:p>
+            <a:endParaRPr lang="zh-CN" altLang="en-US"/>
+          </a:p>
+        </p:txBody>
       </p:sp>
       <p:sp>
         <p:nvSpPr>
@@ -8852,18 +11648,13 @@
           <a:lstStyle/>
           <a:p>
             <a:r>
-              <a:rPr lang="zh-CN" altLang="en-US" sz="3600">
+              <a:rPr lang="zh-CN" altLang="en-US" sz="3600" dirty="0">
                 <a:solidFill>
                   <a:srgbClr val="FFFFFF"/>
                 </a:solidFill>
               </a:rPr>
-              <a:t>详细使用方法</a:t>
-            </a:r>
-            <a:endParaRPr lang="zh-CN" altLang="en-US" sz="3600" dirty="0">
-              <a:solidFill>
-                <a:srgbClr val="FFFFFF"/>
-              </a:solidFill>
-            </a:endParaRPr>
+              <a:t>准备输入文件</a:t>
+            </a:r>
           </a:p>
         </p:txBody>
       </p:sp>
@@ -8921,6 +11712,13 @@
             <a:schemeClr val="lt1"/>
           </a:fontRef>
         </p:style>
+        <p:txBody>
+          <a:bodyPr/>
+          <a:lstStyle/>
+          <a:p>
+            <a:endParaRPr lang="zh-CN" altLang="en-US"/>
+          </a:p>
+        </p:txBody>
       </p:sp>
       <p:graphicFrame>
         <p:nvGraphicFramePr>
@@ -8938,7 +11736,7 @@
             <p:ph idx="1"/>
             <p:extLst>
               <p:ext uri="{D42A27DB-BD31-4B8C-83A1-F6EECF244321}">
-                <p14:modId xmlns:p14="http://schemas.microsoft.com/office/powerpoint/2010/main" val="3657598297"/>
+                <p14:modId xmlns:p14="http://schemas.microsoft.com/office/powerpoint/2010/main" val="872102889"/>
               </p:ext>
             </p:extLst>
           </p:nvPr>
@@ -8967,6 +11765,298 @@
 </file>
 
 <file path=ppt/slides/slide3.xml><?xml version="1.0" encoding="utf-8"?>
+<p:sld xmlns:a="http://schemas.openxmlformats.org/drawingml/2006/main" xmlns:r="http://schemas.openxmlformats.org/officeDocument/2006/relationships" xmlns:p="http://schemas.openxmlformats.org/presentationml/2006/main">
+  <p:cSld>
+    <p:bg>
+      <p:bgPr>
+        <a:solidFill>
+          <a:schemeClr val="bg1"/>
+        </a:solidFill>
+        <a:effectLst/>
+      </p:bgPr>
+    </p:bg>
+    <p:spTree>
+      <p:nvGrpSpPr>
+        <p:cNvPr id="1" name=""/>
+        <p:cNvGrpSpPr/>
+        <p:nvPr/>
+      </p:nvGrpSpPr>
+      <p:grpSpPr>
+        <a:xfrm>
+          <a:off x="0" y="0"/>
+          <a:ext cx="0" cy="0"/>
+          <a:chOff x="0" y="0"/>
+          <a:chExt cx="0" cy="0"/>
+        </a:xfrm>
+      </p:grpSpPr>
+      <p:sp useBgFill="1">
+        <p:nvSpPr>
+          <p:cNvPr id="9" name="Rectangle 8">
+            <a:extLst>
+              <a:ext uri="{FF2B5EF4-FFF2-40B4-BE49-F238E27FC236}">
+                <a16:creationId xmlns:a16="http://schemas.microsoft.com/office/drawing/2014/main" id="{3741B58E-3B65-4A01-A276-975AB2CF8A08}"/>
+              </a:ext>
+              <a:ext uri="{C183D7F6-B498-43B3-948B-1728B52AA6E4}">
+                <adec:decorative xmlns:adec="http://schemas.microsoft.com/office/drawing/2017/decorative" val="1"/>
+              </a:ext>
+            </a:extLst>
+          </p:cNvPr>
+          <p:cNvSpPr>
+            <a:spLocks noGrp="1" noRot="1" noChangeAspect="1" noMove="1" noResize="1" noEditPoints="1" noAdjustHandles="1" noChangeArrowheads="1" noChangeShapeType="1" noTextEdit="1"/>
+          </p:cNvSpPr>
+          <p:nvPr>
+            <p:extLst>
+              <p:ext uri="{386F3935-93C4-4BCD-93E2-E3B085C9AB24}">
+                <p16:designElem xmlns:p16="http://schemas.microsoft.com/office/powerpoint/2015/main" val="1"/>
+              </p:ext>
+            </p:extLst>
+          </p:nvPr>
+        </p:nvSpPr>
+        <p:spPr>
+          <a:xfrm>
+            <a:off x="0" y="0"/>
+            <a:ext cx="12186315" cy="6858000"/>
+          </a:xfrm>
+          <a:prstGeom prst="rect">
+            <a:avLst/>
+          </a:prstGeom>
+          <a:ln>
+            <a:noFill/>
+          </a:ln>
+        </p:spPr>
+        <p:style>
+          <a:lnRef idx="2">
+            <a:schemeClr val="accent6">
+              <a:shade val="50000"/>
+            </a:schemeClr>
+          </a:lnRef>
+          <a:fillRef idx="1001">
+            <a:schemeClr val="lt1"/>
+          </a:fillRef>
+          <a:effectRef idx="0">
+            <a:schemeClr val="accent6"/>
+          </a:effectRef>
+          <a:fontRef idx="minor">
+            <a:schemeClr val="lt1"/>
+          </a:fontRef>
+        </p:style>
+        <p:txBody>
+          <a:bodyPr rtlCol="0" anchor="ctr"/>
+          <a:lstStyle/>
+          <a:p>
+            <a:pPr algn="ctr"/>
+            <a:endParaRPr lang="en-US"/>
+          </a:p>
+        </p:txBody>
+      </p:sp>
+      <p:sp>
+        <p:nvSpPr>
+          <p:cNvPr id="11" name="Rectangle 10">
+            <a:extLst>
+              <a:ext uri="{FF2B5EF4-FFF2-40B4-BE49-F238E27FC236}">
+                <a16:creationId xmlns:a16="http://schemas.microsoft.com/office/drawing/2014/main" id="{7AAC67C3-831B-4AB1-A259-DFB839CAFAFC}"/>
+              </a:ext>
+              <a:ext uri="{C183D7F6-B498-43B3-948B-1728B52AA6E4}">
+                <adec:decorative xmlns:adec="http://schemas.microsoft.com/office/drawing/2017/decorative" val="1"/>
+              </a:ext>
+            </a:extLst>
+          </p:cNvPr>
+          <p:cNvSpPr>
+            <a:spLocks noGrp="1" noRot="1" noChangeAspect="1" noMove="1" noResize="1" noEditPoints="1" noAdjustHandles="1" noChangeArrowheads="1" noChangeShapeType="1" noTextEdit="1"/>
+          </p:cNvSpPr>
+          <p:nvPr>
+            <p:extLst>
+              <p:ext uri="{386F3935-93C4-4BCD-93E2-E3B085C9AB24}">
+                <p16:designElem xmlns:p16="http://schemas.microsoft.com/office/powerpoint/2015/main" val="1"/>
+              </p:ext>
+            </p:extLst>
+          </p:nvPr>
+        </p:nvSpPr>
+        <p:spPr>
+          <a:xfrm>
+            <a:off x="16" y="0"/>
+            <a:ext cx="4050791" cy="6858000"/>
+          </a:xfrm>
+          <a:prstGeom prst="rect">
+            <a:avLst/>
+          </a:prstGeom>
+          <a:solidFill>
+            <a:schemeClr val="accent2"/>
+          </a:solidFill>
+          <a:ln>
+            <a:noFill/>
+          </a:ln>
+        </p:spPr>
+        <p:style>
+          <a:lnRef idx="2">
+            <a:schemeClr val="accent1">
+              <a:shade val="50000"/>
+            </a:schemeClr>
+          </a:lnRef>
+          <a:fillRef idx="1">
+            <a:schemeClr val="accent1"/>
+          </a:fillRef>
+          <a:effectRef idx="0">
+            <a:schemeClr val="accent1"/>
+          </a:effectRef>
+          <a:fontRef idx="minor">
+            <a:schemeClr val="lt1"/>
+          </a:fontRef>
+        </p:style>
+        <p:txBody>
+          <a:bodyPr/>
+          <a:lstStyle/>
+          <a:p>
+            <a:endParaRPr lang="zh-CN" altLang="en-US"/>
+          </a:p>
+        </p:txBody>
+      </p:sp>
+      <p:sp>
+        <p:nvSpPr>
+          <p:cNvPr id="2" name="标题 1">
+            <a:extLst>
+              <a:ext uri="{FF2B5EF4-FFF2-40B4-BE49-F238E27FC236}">
+                <a16:creationId xmlns:a16="http://schemas.microsoft.com/office/drawing/2014/main" id="{5CFAC8CD-04E1-4B73-8DEF-216F48967776}"/>
+              </a:ext>
+            </a:extLst>
+          </p:cNvPr>
+          <p:cNvSpPr>
+            <a:spLocks noGrp="1"/>
+          </p:cNvSpPr>
+          <p:nvPr>
+            <p:ph type="title"/>
+          </p:nvPr>
+        </p:nvSpPr>
+        <p:spPr>
+          <a:xfrm>
+            <a:off x="492370" y="605896"/>
+            <a:ext cx="3084844" cy="5646208"/>
+          </a:xfrm>
+        </p:spPr>
+        <p:txBody>
+          <a:bodyPr anchor="ctr">
+            <a:normAutofit/>
+          </a:bodyPr>
+          <a:lstStyle/>
+          <a:p>
+            <a:r>
+              <a:rPr lang="zh-CN" altLang="en-US" sz="3600">
+                <a:solidFill>
+                  <a:srgbClr val="FFFFFF"/>
+                </a:solidFill>
+              </a:rPr>
+              <a:t>详细使用方法</a:t>
+            </a:r>
+            <a:endParaRPr lang="zh-CN" altLang="en-US" sz="3600" dirty="0">
+              <a:solidFill>
+                <a:srgbClr val="FFFFFF"/>
+              </a:solidFill>
+            </a:endParaRPr>
+          </a:p>
+        </p:txBody>
+      </p:sp>
+      <p:sp>
+        <p:nvSpPr>
+          <p:cNvPr id="13" name="Rectangle 12">
+            <a:extLst>
+              <a:ext uri="{FF2B5EF4-FFF2-40B4-BE49-F238E27FC236}">
+                <a16:creationId xmlns:a16="http://schemas.microsoft.com/office/drawing/2014/main" id="{054B3F04-9EAC-45C0-B3CE-0387EEA10A0C}"/>
+              </a:ext>
+              <a:ext uri="{C183D7F6-B498-43B3-948B-1728B52AA6E4}">
+                <adec:decorative xmlns:adec="http://schemas.microsoft.com/office/drawing/2017/decorative" val="1"/>
+              </a:ext>
+            </a:extLst>
+          </p:cNvPr>
+          <p:cNvSpPr>
+            <a:spLocks noGrp="1" noRot="1" noChangeAspect="1" noMove="1" noResize="1" noEditPoints="1" noAdjustHandles="1" noChangeArrowheads="1" noChangeShapeType="1" noTextEdit="1"/>
+          </p:cNvSpPr>
+          <p:nvPr>
+            <p:extLst>
+              <p:ext uri="{386F3935-93C4-4BCD-93E2-E3B085C9AB24}">
+                <p16:designElem xmlns:p16="http://schemas.microsoft.com/office/powerpoint/2015/main" val="1"/>
+              </p:ext>
+            </p:extLst>
+          </p:nvPr>
+        </p:nvSpPr>
+        <p:spPr>
+          <a:xfrm>
+            <a:off x="4040071" y="0"/>
+            <a:ext cx="64008" cy="6858000"/>
+          </a:xfrm>
+          <a:prstGeom prst="rect">
+            <a:avLst/>
+          </a:prstGeom>
+          <a:solidFill>
+            <a:schemeClr val="accent1"/>
+          </a:solidFill>
+          <a:ln>
+            <a:noFill/>
+          </a:ln>
+        </p:spPr>
+        <p:style>
+          <a:lnRef idx="2">
+            <a:schemeClr val="accent1">
+              <a:shade val="50000"/>
+            </a:schemeClr>
+          </a:lnRef>
+          <a:fillRef idx="1">
+            <a:schemeClr val="accent1"/>
+          </a:fillRef>
+          <a:effectRef idx="0">
+            <a:schemeClr val="accent1"/>
+          </a:effectRef>
+          <a:fontRef idx="minor">
+            <a:schemeClr val="lt1"/>
+          </a:fontRef>
+        </p:style>
+        <p:txBody>
+          <a:bodyPr/>
+          <a:lstStyle/>
+          <a:p>
+            <a:endParaRPr lang="zh-CN" altLang="en-US"/>
+          </a:p>
+        </p:txBody>
+      </p:sp>
+      <p:graphicFrame>
+        <p:nvGraphicFramePr>
+          <p:cNvPr id="15" name="内容占位符 3">
+            <a:extLst>
+              <a:ext uri="{FF2B5EF4-FFF2-40B4-BE49-F238E27FC236}">
+                <a16:creationId xmlns:a16="http://schemas.microsoft.com/office/drawing/2014/main" id="{4904B2C1-37CA-4570-A9FC-7DAD2980C48D}"/>
+              </a:ext>
+            </a:extLst>
+          </p:cNvPr>
+          <p:cNvGraphicFramePr>
+            <a:graphicFrameLocks noGrp="1"/>
+          </p:cNvGraphicFramePr>
+          <p:nvPr>
+            <p:ph idx="1"/>
+          </p:nvPr>
+        </p:nvGraphicFramePr>
+        <p:xfrm>
+          <a:off x="4807331" y="372631"/>
+          <a:ext cx="6413663" cy="5646208"/>
+        </p:xfrm>
+        <a:graphic>
+          <a:graphicData uri="http://schemas.openxmlformats.org/drawingml/2006/diagram">
+            <dgm:relIds xmlns:dgm="http://schemas.openxmlformats.org/drawingml/2006/diagram" xmlns:r="http://schemas.openxmlformats.org/officeDocument/2006/relationships" r:dm="rId2" r:lo="rId3" r:qs="rId4" r:cs="rId5"/>
+          </a:graphicData>
+        </a:graphic>
+      </p:graphicFrame>
+    </p:spTree>
+    <p:extLst>
+      <p:ext uri="{BB962C8B-B14F-4D97-AF65-F5344CB8AC3E}">
+        <p14:creationId xmlns:p14="http://schemas.microsoft.com/office/powerpoint/2010/main" val="3125110982"/>
+      </p:ext>
+    </p:extLst>
+  </p:cSld>
+  <p:clrMapOvr>
+    <a:masterClrMapping/>
+  </p:clrMapOvr>
+</p:sld>
+</file>
+
+<file path=ppt/slides/slide4.xml><?xml version="1.0" encoding="utf-8"?>
 <p:sld xmlns:a="http://schemas.openxmlformats.org/drawingml/2006/main" xmlns:r="http://schemas.openxmlformats.org/officeDocument/2006/relationships" xmlns:p="http://schemas.openxmlformats.org/presentationml/2006/main">
   <p:cSld>
     <p:bg>
@@ -9105,6 +12195,13 @@
             <a:schemeClr val="lt1"/>
           </a:fontRef>
         </p:style>
+        <p:txBody>
+          <a:bodyPr/>
+          <a:lstStyle/>
+          <a:p>
+            <a:endParaRPr lang="zh-CN" altLang="en-US"/>
+          </a:p>
+        </p:txBody>
       </p:sp>
       <p:sp>
         <p:nvSpPr>
@@ -9207,6 +12304,13 @@
             <a:schemeClr val="lt1"/>
           </a:fontRef>
         </p:style>
+        <p:txBody>
+          <a:bodyPr/>
+          <a:lstStyle/>
+          <a:p>
+            <a:endParaRPr lang="zh-CN" altLang="en-US"/>
+          </a:p>
+        </p:txBody>
       </p:sp>
       <p:sp>
         <p:nvSpPr>
@@ -9231,7 +12335,7 @@
         </p:spPr>
         <p:txBody>
           <a:bodyPr vert="horz" lIns="0" tIns="45720" rIns="0" bIns="45720" rtlCol="0" anchor="ctr">
-            <a:normAutofit fontScale="92500" lnSpcReduction="10000"/>
+            <a:normAutofit fontScale="85000" lnSpcReduction="20000"/>
           </a:bodyPr>
           <a:lstStyle/>
           <a:p>
@@ -9292,7 +12396,7 @@
                   </a:schemeClr>
                 </a:solidFill>
               </a:rPr>
-              <a:t>## </a:t>
+              <a:t>#</a:t>
             </a:r>
             <a:r>
               <a:rPr lang="zh-CN" altLang="en-US" sz="1200" dirty="0">
@@ -9303,7 +12407,195 @@
                   </a:schemeClr>
                 </a:solidFill>
               </a:rPr>
-              <a:t>工作路径</a:t>
+              <a:t>指定基因组的数量是</a:t>
+            </a:r>
+            <a:r>
+              <a:rPr lang="en-US" altLang="zh-CN" sz="1200" dirty="0">
+                <a:solidFill>
+                  <a:schemeClr val="tx1">
+                    <a:lumMod val="75000"/>
+                    <a:lumOff val="25000"/>
+                  </a:schemeClr>
+                </a:solidFill>
+              </a:rPr>
+              <a:t>1</a:t>
+            </a:r>
+            <a:r>
+              <a:rPr lang="zh-CN" altLang="en-US" sz="1200" dirty="0">
+                <a:solidFill>
+                  <a:schemeClr val="tx1">
+                    <a:lumMod val="75000"/>
+                    <a:lumOff val="25000"/>
+                  </a:schemeClr>
+                </a:solidFill>
+              </a:rPr>
+              <a:t>或</a:t>
+            </a:r>
+            <a:r>
+              <a:rPr lang="en-US" altLang="zh-CN" sz="1200" dirty="0">
+                <a:solidFill>
+                  <a:schemeClr val="tx1">
+                    <a:lumMod val="75000"/>
+                    <a:lumOff val="25000"/>
+                  </a:schemeClr>
+                </a:solidFill>
+              </a:rPr>
+              <a:t>2</a:t>
+            </a:r>
+          </a:p>
+          <a:p>
+            <a:pPr defTabSz="914400">
+              <a:lnSpc>
+                <a:spcPct val="90000"/>
+              </a:lnSpc>
+              <a:spcAft>
+                <a:spcPts val="600"/>
+              </a:spcAft>
+              <a:buClr>
+                <a:schemeClr val="accent1"/>
+              </a:buClr>
+              <a:buFont typeface="Calibri" panose="020F0502020204030204" pitchFamily="34" charset="0"/>
+            </a:pPr>
+            <a:r>
+              <a:rPr lang="en-US" altLang="zh-CN" sz="1200" dirty="0">
+                <a:solidFill>
+                  <a:schemeClr val="tx1">
+                    <a:lumMod val="75000"/>
+                    <a:lumOff val="25000"/>
+                  </a:schemeClr>
+                </a:solidFill>
+              </a:rPr>
+              <a:t>group=1</a:t>
+            </a:r>
+          </a:p>
+          <a:p>
+            <a:pPr defTabSz="914400">
+              <a:lnSpc>
+                <a:spcPct val="90000"/>
+              </a:lnSpc>
+              <a:spcAft>
+                <a:spcPts val="600"/>
+              </a:spcAft>
+              <a:buClr>
+                <a:schemeClr val="accent1"/>
+              </a:buClr>
+              <a:buFont typeface="Calibri" panose="020F0502020204030204" pitchFamily="34" charset="0"/>
+            </a:pPr>
+            <a:r>
+              <a:rPr lang="en-US" altLang="zh-CN" sz="1200" dirty="0">
+                <a:solidFill>
+                  <a:schemeClr val="tx1">
+                    <a:lumMod val="75000"/>
+                    <a:lumOff val="25000"/>
+                  </a:schemeClr>
+                </a:solidFill>
+              </a:rPr>
+              <a:t># </a:t>
+            </a:r>
+            <a:r>
+              <a:rPr lang="zh-CN" altLang="en-US" sz="1200" dirty="0">
+                <a:solidFill>
+                  <a:schemeClr val="tx1">
+                    <a:lumMod val="75000"/>
+                    <a:lumOff val="25000"/>
+                  </a:schemeClr>
+                </a:solidFill>
+              </a:rPr>
+              <a:t>指定使用的</a:t>
+            </a:r>
+            <a:r>
+              <a:rPr lang="en-US" altLang="zh-CN" sz="1200" dirty="0" err="1">
+                <a:solidFill>
+                  <a:schemeClr val="tx1">
+                    <a:lumMod val="75000"/>
+                    <a:lumOff val="25000"/>
+                  </a:schemeClr>
+                </a:solidFill>
+              </a:rPr>
+              <a:t>cpu</a:t>
+            </a:r>
+            <a:r>
+              <a:rPr lang="zh-CN" altLang="en-US" sz="1200" dirty="0">
+                <a:solidFill>
+                  <a:schemeClr val="tx1">
+                    <a:lumMod val="75000"/>
+                    <a:lumOff val="25000"/>
+                  </a:schemeClr>
+                </a:solidFill>
+              </a:rPr>
+              <a:t>进程数量，默认是</a:t>
+            </a:r>
+            <a:r>
+              <a:rPr lang="en-US" altLang="zh-CN" sz="1200" dirty="0">
+                <a:solidFill>
+                  <a:schemeClr val="tx1">
+                    <a:lumMod val="75000"/>
+                    <a:lumOff val="25000"/>
+                  </a:schemeClr>
+                </a:solidFill>
+              </a:rPr>
+              <a:t>24</a:t>
+            </a:r>
+          </a:p>
+          <a:p>
+            <a:pPr defTabSz="914400">
+              <a:lnSpc>
+                <a:spcPct val="90000"/>
+              </a:lnSpc>
+              <a:spcAft>
+                <a:spcPts val="600"/>
+              </a:spcAft>
+              <a:buClr>
+                <a:schemeClr val="accent1"/>
+              </a:buClr>
+              <a:buFont typeface="Calibri" panose="020F0502020204030204" pitchFamily="34" charset="0"/>
+            </a:pPr>
+            <a:r>
+              <a:rPr lang="en-US" altLang="zh-CN" sz="1200" dirty="0">
+                <a:solidFill>
+                  <a:schemeClr val="tx1">
+                    <a:lumMod val="75000"/>
+                    <a:lumOff val="25000"/>
+                  </a:schemeClr>
+                </a:solidFill>
+              </a:rPr>
+              <a:t>Threads=24</a:t>
+            </a:r>
+          </a:p>
+          <a:p>
+            <a:pPr defTabSz="914400">
+              <a:lnSpc>
+                <a:spcPct val="90000"/>
+              </a:lnSpc>
+              <a:spcAft>
+                <a:spcPts val="600"/>
+              </a:spcAft>
+              <a:buClr>
+                <a:schemeClr val="accent1"/>
+              </a:buClr>
+              <a:buFont typeface="Calibri" panose="020F0502020204030204" pitchFamily="34" charset="0"/>
+            </a:pPr>
+            <a:r>
+              <a:rPr lang="en-US" altLang="zh-CN" sz="1200" dirty="0">
+                <a:solidFill>
+                  <a:schemeClr val="tx1">
+                    <a:lumMod val="75000"/>
+                    <a:lumOff val="25000"/>
+                  </a:schemeClr>
+                </a:solidFill>
+              </a:rPr>
+              <a:t>## </a:t>
+            </a:r>
+            <a:r>
+              <a:rPr lang="zh-CN" altLang="en-US" sz="1200" dirty="0">
+                <a:solidFill>
+                  <a:schemeClr val="tx1">
+                    <a:lumMod val="75000"/>
+                    <a:lumOff val="25000"/>
+                  </a:schemeClr>
+                </a:solidFill>
+              </a:rPr>
+              <a:t>指定工作路径</a:t>
             </a:r>
             <a:endParaRPr lang="en-US" altLang="zh-CN" sz="1200" dirty="0">
               <a:solidFill>
@@ -9441,7 +12733,7 @@
                   </a:schemeClr>
                 </a:solidFill>
               </a:rPr>
-              <a:t>样本组数，只能是</a:t>
+              <a:t>样本组数，此处只能是</a:t>
             </a:r>
             <a:r>
               <a:rPr lang="en-US" altLang="zh-CN" sz="1200" dirty="0">
@@ -9453,39 +12745,6 @@
                 </a:solidFill>
               </a:rPr>
               <a:t>1</a:t>
-            </a:r>
-            <a:r>
-              <a:rPr lang="zh-CN" altLang="en-US" sz="1200" dirty="0">
-                <a:solidFill>
-                  <a:schemeClr val="tx1">
-                    <a:lumMod val="75000"/>
-                    <a:lumOff val="25000"/>
-                  </a:schemeClr>
-                </a:solidFill>
-              </a:rPr>
-              <a:t>或</a:t>
-            </a:r>
-            <a:r>
-              <a:rPr lang="en-US" altLang="zh-CN" sz="1200" dirty="0">
-                <a:solidFill>
-                  <a:schemeClr val="tx1">
-                    <a:lumMod val="75000"/>
-                    <a:lumOff val="25000"/>
-                  </a:schemeClr>
-                </a:solidFill>
-              </a:rPr>
-              <a:t>2</a:t>
-            </a:r>
-            <a:r>
-              <a:rPr lang="zh-CN" altLang="en-US" sz="1200" dirty="0">
-                <a:solidFill>
-                  <a:schemeClr val="tx1">
-                    <a:lumMod val="75000"/>
-                    <a:lumOff val="25000"/>
-                  </a:schemeClr>
-                </a:solidFill>
-              </a:rPr>
-              <a:t>，应该和输入的参数的数目一致</a:t>
             </a:r>
           </a:p>
           <a:p>
@@ -10208,7 +13467,29 @@
                   </a:schemeClr>
                 </a:solidFill>
               </a:rPr>
-              <a:t>group=2</a:t>
+              <a:t>group=2 #</a:t>
+            </a:r>
+            <a:r>
+              <a:rPr lang="zh-CN" altLang="en-US" sz="1200" dirty="0">
+                <a:solidFill>
+                  <a:schemeClr val="tx1">
+                    <a:lumMod val="75000"/>
+                    <a:lumOff val="25000"/>
+                  </a:schemeClr>
+                </a:solidFill>
+              </a:rPr>
+              <a:t>样本组数，此处只能是</a:t>
+            </a:r>
+            <a:r>
+              <a:rPr lang="en-US" altLang="zh-CN" sz="1200" dirty="0">
+                <a:solidFill>
+                  <a:schemeClr val="tx1">
+                    <a:lumMod val="75000"/>
+                    <a:lumOff val="25000"/>
+                  </a:schemeClr>
+                </a:solidFill>
+              </a:rPr>
+              <a:t>2</a:t>
             </a:r>
           </a:p>
           <a:p>
@@ -10255,7 +13536,7 @@
                   </a:schemeClr>
                 </a:solidFill>
               </a:rPr>
-              <a:t> ID) #gff3</a:t>
+              <a:t> ID)  #gff3</a:t>
             </a:r>
             <a:r>
               <a:rPr lang="zh-CN" altLang="en-US" sz="1200" dirty="0">
@@ -10313,7 +13594,7 @@
                   </a:schemeClr>
                 </a:solidFill>
               </a:rPr>
-              <a:t>type=(mRNA mRNA) #gff3</a:t>
+              <a:t>type=(mRNA mRNA)  #gff3</a:t>
             </a:r>
             <a:r>
               <a:rPr lang="zh-CN" altLang="en-US" sz="1200" dirty="0">
@@ -10415,8 +13696,27 @@
                   </a:schemeClr>
                 </a:solidFill>
               </a:rPr>
-              <a:t>)</a:t>
-            </a:r>
+              <a:t>) #</a:t>
+            </a:r>
+            <a:r>
+              <a:rPr lang="zh-CN" altLang="en-US" sz="1200" dirty="0">
+                <a:solidFill>
+                  <a:schemeClr val="tx1">
+                    <a:lumMod val="75000"/>
+                    <a:lumOff val="25000"/>
+                  </a:schemeClr>
+                </a:solidFill>
+              </a:rPr>
+              <a:t>物种的拉丁学名</a:t>
+            </a:r>
+            <a:endParaRPr lang="en-US" altLang="zh-CN" sz="1200" dirty="0">
+              <a:solidFill>
+                <a:schemeClr val="tx1">
+                  <a:lumMod val="75000"/>
+                  <a:lumOff val="25000"/>
+                </a:schemeClr>
+              </a:solidFill>
+            </a:endParaRPr>
           </a:p>
           <a:p>
             <a:pPr defTabSz="914400">
@@ -10451,7 +13751,7 @@
                   </a:schemeClr>
                 </a:solidFill>
               </a:rPr>
-              <a:t>=(</a:t>
+              <a:t>=(Ath </a:t>
             </a:r>
             <a:r>
               <a:rPr lang="en-US" altLang="zh-CN" sz="1200" dirty="0" err="1">
@@ -10462,7 +13762,7 @@
                   </a:schemeClr>
                 </a:solidFill>
               </a:rPr>
-              <a:t>Ath</a:t>
+              <a:t>Spo</a:t>
             </a:r>
             <a:r>
               <a:rPr lang="en-US" altLang="zh-CN" sz="1200" dirty="0">
@@ -10473,10 +13773,10 @@
                   </a:schemeClr>
                 </a:solidFill>
               </a:rPr>
-              <a:t> </a:t>
-            </a:r>
-            <a:r>
-              <a:rPr lang="en-US" altLang="zh-CN" sz="1200" dirty="0" err="1">
+              <a:t>) #</a:t>
+            </a:r>
+            <a:r>
+              <a:rPr lang="zh-CN" altLang="en-US" sz="1200" dirty="0">
                 <a:solidFill>
                   <a:schemeClr val="tx1">
                     <a:lumMod val="75000"/>
@@ -10484,19 +13784,16 @@
                   </a:schemeClr>
                 </a:solidFill>
               </a:rPr>
-              <a:t>Spo</a:t>
-            </a:r>
-            <a:r>
-              <a:rPr lang="en-US" altLang="zh-CN" sz="1200" dirty="0">
-                <a:solidFill>
-                  <a:schemeClr val="tx1">
-                    <a:lumMod val="75000"/>
-                    <a:lumOff val="25000"/>
-                  </a:schemeClr>
-                </a:solidFill>
-              </a:rPr>
-              <a:t>)</a:t>
-            </a:r>
+              <a:t>物种名称的简称，一般是三字符缩写</a:t>
+            </a:r>
+            <a:endParaRPr lang="en-US" altLang="zh-CN" sz="1200" dirty="0">
+              <a:solidFill>
+                <a:schemeClr val="tx1">
+                  <a:lumMod val="75000"/>
+                  <a:lumOff val="25000"/>
+                </a:schemeClr>
+              </a:solidFill>
+            </a:endParaRPr>
           </a:p>
           <a:p>
             <a:pPr defTabSz="914400">
@@ -10520,8 +13817,49 @@
                   </a:schemeClr>
                 </a:solidFill>
               </a:rPr>
-              <a:t>gff3=(Ath.chr1.gff3 Spo.chr1.gff3)</a:t>
-            </a:r>
+              <a:t>gff3=(Ath.chr1.gff3 Spo.chr1.gff3) # </a:t>
+            </a:r>
+            <a:r>
+              <a:rPr lang="zh-CN" altLang="en-US" sz="1200" dirty="0">
+                <a:solidFill>
+                  <a:schemeClr val="tx1">
+                    <a:lumMod val="75000"/>
+                    <a:lumOff val="25000"/>
+                  </a:schemeClr>
+                </a:solidFill>
+              </a:rPr>
+              <a:t>基因组的</a:t>
+            </a:r>
+            <a:r>
+              <a:rPr lang="en-US" altLang="zh-CN" sz="1200" dirty="0">
+                <a:solidFill>
+                  <a:schemeClr val="tx1">
+                    <a:lumMod val="75000"/>
+                    <a:lumOff val="25000"/>
+                  </a:schemeClr>
+                </a:solidFill>
+              </a:rPr>
+              <a:t>gff3</a:t>
+            </a:r>
+            <a:r>
+              <a:rPr lang="zh-CN" altLang="en-US" sz="1200" dirty="0">
+                <a:solidFill>
+                  <a:schemeClr val="tx1">
+                    <a:lumMod val="75000"/>
+                    <a:lumOff val="25000"/>
+                  </a:schemeClr>
+                </a:solidFill>
+              </a:rPr>
+              <a:t>文件</a:t>
+            </a:r>
+            <a:endParaRPr lang="en-US" altLang="zh-CN" sz="1200" dirty="0">
+              <a:solidFill>
+                <a:schemeClr val="tx1">
+                  <a:lumMod val="75000"/>
+                  <a:lumOff val="25000"/>
+                </a:schemeClr>
+              </a:solidFill>
+            </a:endParaRPr>
           </a:p>
           <a:p>
             <a:pPr defTabSz="914400">
@@ -10567,8 +13905,27 @@
                   </a:schemeClr>
                 </a:solidFill>
               </a:rPr>
-              <a:t>)</a:t>
-            </a:r>
+              <a:t>) # </a:t>
+            </a:r>
+            <a:r>
+              <a:rPr lang="zh-CN" altLang="en-US" sz="1200" dirty="0">
+                <a:solidFill>
+                  <a:schemeClr val="tx1">
+                    <a:lumMod val="75000"/>
+                    <a:lumOff val="25000"/>
+                  </a:schemeClr>
+                </a:solidFill>
+              </a:rPr>
+              <a:t>基因组的编码基因的蛋白文件</a:t>
+            </a:r>
+            <a:endParaRPr lang="en-US" altLang="zh-CN" sz="1200" dirty="0">
+              <a:solidFill>
+                <a:schemeClr val="tx1">
+                  <a:lumMod val="75000"/>
+                  <a:lumOff val="25000"/>
+                </a:schemeClr>
+              </a:solidFill>
+            </a:endParaRPr>
           </a:p>
           <a:p>
             <a:pPr defTabSz="914400">
@@ -10614,8 +13971,49 @@
                   </a:schemeClr>
                 </a:solidFill>
               </a:rPr>
-              <a:t>)</a:t>
-            </a:r>
+              <a:t>) #</a:t>
+            </a:r>
+            <a:r>
+              <a:rPr lang="zh-CN" altLang="en-US" sz="1200" dirty="0">
+                <a:solidFill>
+                  <a:schemeClr val="tx1">
+                    <a:lumMod val="75000"/>
+                    <a:lumOff val="25000"/>
+                  </a:schemeClr>
+                </a:solidFill>
+              </a:rPr>
+              <a:t>基因组的</a:t>
+            </a:r>
+            <a:r>
+              <a:rPr lang="en-US" altLang="zh-CN" sz="1200" dirty="0" err="1">
+                <a:solidFill>
+                  <a:schemeClr val="tx1">
+                    <a:lumMod val="75000"/>
+                    <a:lumOff val="25000"/>
+                  </a:schemeClr>
+                </a:solidFill>
+              </a:rPr>
+              <a:t>cds</a:t>
+            </a:r>
+            <a:r>
+              <a:rPr lang="zh-CN" altLang="en-US" sz="1200" dirty="0">
+                <a:solidFill>
+                  <a:schemeClr val="tx1">
+                    <a:lumMod val="75000"/>
+                    <a:lumOff val="25000"/>
+                  </a:schemeClr>
+                </a:solidFill>
+              </a:rPr>
+              <a:t>序列</a:t>
+            </a:r>
+            <a:endParaRPr lang="en-US" altLang="zh-CN" sz="1200" dirty="0">
+              <a:solidFill>
+                <a:schemeClr val="tx1">
+                  <a:lumMod val="75000"/>
+                  <a:lumOff val="25000"/>
+                </a:schemeClr>
+              </a:solidFill>
+            </a:endParaRPr>
           </a:p>
           <a:p>
             <a:pPr defTabSz="914400">
@@ -10650,8 +14048,49 @@
                   </a:schemeClr>
                 </a:solidFill>
               </a:rPr>
-              <a:t>=(1,1)</a:t>
-            </a:r>
+              <a:t>=(1,1) #</a:t>
+            </a:r>
+            <a:r>
+              <a:rPr lang="zh-CN" altLang="en-US" sz="1200" dirty="0">
+                <a:solidFill>
+                  <a:schemeClr val="tx1">
+                    <a:lumMod val="75000"/>
+                    <a:lumOff val="25000"/>
+                  </a:schemeClr>
+                </a:solidFill>
+              </a:rPr>
+              <a:t>基因组的染色体数量，如果没有组装到染色体水平，则写要绘图的</a:t>
+            </a:r>
+            <a:r>
+              <a:rPr lang="en-US" altLang="zh-CN" sz="1200" dirty="0">
+                <a:solidFill>
+                  <a:schemeClr val="tx1">
+                    <a:lumMod val="75000"/>
+                    <a:lumOff val="25000"/>
+                  </a:schemeClr>
+                </a:solidFill>
+              </a:rPr>
+              <a:t>scaffold</a:t>
+            </a:r>
+            <a:r>
+              <a:rPr lang="zh-CN" altLang="en-US" sz="1200" dirty="0">
+                <a:solidFill>
+                  <a:schemeClr val="tx1">
+                    <a:lumMod val="75000"/>
+                    <a:lumOff val="25000"/>
+                  </a:schemeClr>
+                </a:solidFill>
+              </a:rPr>
+              <a:t>数量</a:t>
+            </a:r>
+            <a:endParaRPr lang="en-US" altLang="zh-CN" sz="1200" dirty="0">
+              <a:solidFill>
+                <a:schemeClr val="tx1">
+                  <a:lumMod val="75000"/>
+                  <a:lumOff val="25000"/>
+                </a:schemeClr>
+              </a:solidFill>
+            </a:endParaRPr>
           </a:p>
         </p:txBody>
       </p:sp>
@@ -10668,7 +14107,7 @@
 </p:sld>
 </file>
 
-<file path=ppt/slides/slide4.xml><?xml version="1.0" encoding="utf-8"?>
+<file path=ppt/slides/slide5.xml><?xml version="1.0" encoding="utf-8"?>
 <p:sld xmlns:a="http://schemas.openxmlformats.org/drawingml/2006/main" xmlns:r="http://schemas.openxmlformats.org/officeDocument/2006/relationships" xmlns:p="http://schemas.openxmlformats.org/presentationml/2006/main">
   <p:cSld>
     <p:bg>
@@ -10807,6 +14246,13 @@
             <a:schemeClr val="lt1"/>
           </a:fontRef>
         </p:style>
+        <p:txBody>
+          <a:bodyPr/>
+          <a:lstStyle/>
+          <a:p>
+            <a:endParaRPr lang="zh-CN" altLang="en-US"/>
+          </a:p>
+        </p:txBody>
       </p:sp>
       <p:sp>
         <p:nvSpPr>
@@ -11063,6 +14509,13 @@
             <a:schemeClr val="lt1"/>
           </a:fontRef>
         </p:style>
+        <p:txBody>
+          <a:bodyPr/>
+          <a:lstStyle/>
+          <a:p>
+            <a:endParaRPr lang="zh-CN" altLang="en-US"/>
+          </a:p>
+        </p:txBody>
       </p:sp>
       <p:pic>
         <p:nvPicPr>

</xml_diff>